<commit_message>
Zombie base class test. Document changes
</commit_message>
<xml_diff>
--- a/AliensVsZombieDocument.pptx
+++ b/AliensVsZombieDocument.pptx
@@ -262,7 +262,7 @@
           <a:p>
             <a:fld id="{FF8D5B93-4A56-43E3-B26B-02DC0C7CF848}" type="datetimeFigureOut">
               <a:rPr lang="en-AU" smtClean="0"/>
-              <a:t>1/11/2019</a:t>
+              <a:t>3/11/2019</a:t>
             </a:fld>
             <a:endParaRPr lang="en-AU"/>
           </a:p>
@@ -462,7 +462,7 @@
           <a:p>
             <a:fld id="{FF8D5B93-4A56-43E3-B26B-02DC0C7CF848}" type="datetimeFigureOut">
               <a:rPr lang="en-AU" smtClean="0"/>
-              <a:t>1/11/2019</a:t>
+              <a:t>3/11/2019</a:t>
             </a:fld>
             <a:endParaRPr lang="en-AU"/>
           </a:p>
@@ -672,7 +672,7 @@
           <a:p>
             <a:fld id="{FF8D5B93-4A56-43E3-B26B-02DC0C7CF848}" type="datetimeFigureOut">
               <a:rPr lang="en-AU" smtClean="0"/>
-              <a:t>1/11/2019</a:t>
+              <a:t>3/11/2019</a:t>
             </a:fld>
             <a:endParaRPr lang="en-AU"/>
           </a:p>
@@ -872,7 +872,7 @@
           <a:p>
             <a:fld id="{FF8D5B93-4A56-43E3-B26B-02DC0C7CF848}" type="datetimeFigureOut">
               <a:rPr lang="en-AU" smtClean="0"/>
-              <a:t>1/11/2019</a:t>
+              <a:t>3/11/2019</a:t>
             </a:fld>
             <a:endParaRPr lang="en-AU"/>
           </a:p>
@@ -1148,7 +1148,7 @@
           <a:p>
             <a:fld id="{FF8D5B93-4A56-43E3-B26B-02DC0C7CF848}" type="datetimeFigureOut">
               <a:rPr lang="en-AU" smtClean="0"/>
-              <a:t>1/11/2019</a:t>
+              <a:t>3/11/2019</a:t>
             </a:fld>
             <a:endParaRPr lang="en-AU"/>
           </a:p>
@@ -1416,7 +1416,7 @@
           <a:p>
             <a:fld id="{FF8D5B93-4A56-43E3-B26B-02DC0C7CF848}" type="datetimeFigureOut">
               <a:rPr lang="en-AU" smtClean="0"/>
-              <a:t>1/11/2019</a:t>
+              <a:t>3/11/2019</a:t>
             </a:fld>
             <a:endParaRPr lang="en-AU"/>
           </a:p>
@@ -1831,7 +1831,7 @@
           <a:p>
             <a:fld id="{FF8D5B93-4A56-43E3-B26B-02DC0C7CF848}" type="datetimeFigureOut">
               <a:rPr lang="en-AU" smtClean="0"/>
-              <a:t>1/11/2019</a:t>
+              <a:t>3/11/2019</a:t>
             </a:fld>
             <a:endParaRPr lang="en-AU"/>
           </a:p>
@@ -1973,7 +1973,7 @@
           <a:p>
             <a:fld id="{FF8D5B93-4A56-43E3-B26B-02DC0C7CF848}" type="datetimeFigureOut">
               <a:rPr lang="en-AU" smtClean="0"/>
-              <a:t>1/11/2019</a:t>
+              <a:t>3/11/2019</a:t>
             </a:fld>
             <a:endParaRPr lang="en-AU"/>
           </a:p>
@@ -2086,7 +2086,7 @@
           <a:p>
             <a:fld id="{FF8D5B93-4A56-43E3-B26B-02DC0C7CF848}" type="datetimeFigureOut">
               <a:rPr lang="en-AU" smtClean="0"/>
-              <a:t>1/11/2019</a:t>
+              <a:t>3/11/2019</a:t>
             </a:fld>
             <a:endParaRPr lang="en-AU"/>
           </a:p>
@@ -2399,7 +2399,7 @@
           <a:p>
             <a:fld id="{FF8D5B93-4A56-43E3-B26B-02DC0C7CF848}" type="datetimeFigureOut">
               <a:rPr lang="en-AU" smtClean="0"/>
-              <a:t>1/11/2019</a:t>
+              <a:t>3/11/2019</a:t>
             </a:fld>
             <a:endParaRPr lang="en-AU"/>
           </a:p>
@@ -2688,7 +2688,7 @@
           <a:p>
             <a:fld id="{FF8D5B93-4A56-43E3-B26B-02DC0C7CF848}" type="datetimeFigureOut">
               <a:rPr lang="en-AU" smtClean="0"/>
-              <a:t>1/11/2019</a:t>
+              <a:t>3/11/2019</a:t>
             </a:fld>
             <a:endParaRPr lang="en-AU"/>
           </a:p>
@@ -2931,7 +2931,7 @@
           <a:p>
             <a:fld id="{FF8D5B93-4A56-43E3-B26B-02DC0C7CF848}" type="datetimeFigureOut">
               <a:rPr lang="en-AU" smtClean="0"/>
-              <a:t>1/11/2019</a:t>
+              <a:t>3/11/2019</a:t>
             </a:fld>
             <a:endParaRPr lang="en-AU"/>
           </a:p>
@@ -3709,8 +3709,8 @@
         </p:nvSpPr>
         <p:spPr>
           <a:xfrm>
-            <a:off x="3196553" y="1261996"/>
-            <a:ext cx="3226845" cy="1600438"/>
+            <a:off x="2869155" y="1261996"/>
+            <a:ext cx="2541045" cy="1600438"/>
           </a:xfrm>
           <a:prstGeom prst="rect">
             <a:avLst/>
@@ -3759,7 +3759,7 @@
                   </a:schemeClr>
                 </a:solidFill>
               </a:rPr>
-              <a:t>Laser and Pull beam functionality</a:t>
+              <a:t>Laser and Pull beam</a:t>
             </a:r>
           </a:p>
           <a:p>
@@ -3842,8 +3842,8 @@
         </p:nvSpPr>
         <p:spPr>
           <a:xfrm>
-            <a:off x="6775441" y="1261996"/>
-            <a:ext cx="3226845" cy="1600438"/>
+            <a:off x="5248276" y="1252395"/>
+            <a:ext cx="3007807" cy="1815882"/>
           </a:xfrm>
           <a:prstGeom prst="rect">
             <a:avLst/>
@@ -3942,6 +3942,527 @@
               </a:rPr>
               <a:t>Quaternion Rotation problem solving</a:t>
             </a:r>
+          </a:p>
+        </p:txBody>
+      </p:sp>
+      <p:sp>
+        <p:nvSpPr>
+          <p:cNvPr id="8" name="TextBox 7">
+            <a:extLst>
+              <a:ext uri="{FF2B5EF4-FFF2-40B4-BE49-F238E27FC236}">
+                <a16:creationId xmlns:a16="http://schemas.microsoft.com/office/drawing/2014/main" id="{A7DEF71E-7A7B-4439-B04D-954A3E9D803B}"/>
+              </a:ext>
+            </a:extLst>
+          </p:cNvPr>
+          <p:cNvSpPr txBox="1"/>
+          <p:nvPr/>
+        </p:nvSpPr>
+        <p:spPr>
+          <a:xfrm>
+            <a:off x="8151308" y="1252395"/>
+            <a:ext cx="2640518" cy="1815882"/>
+          </a:xfrm>
+          <a:prstGeom prst="rect">
+            <a:avLst/>
+          </a:prstGeom>
+          <a:noFill/>
+        </p:spPr>
+        <p:txBody>
+          <a:bodyPr wrap="square" rtlCol="0">
+            <a:spAutoFit/>
+          </a:bodyPr>
+          <a:lstStyle/>
+          <a:p>
+            <a:r>
+              <a:rPr lang="en-AU" sz="1400" dirty="0">
+                <a:solidFill>
+                  <a:schemeClr val="bg1">
+                    <a:lumMod val="85000"/>
+                  </a:schemeClr>
+                </a:solidFill>
+              </a:rPr>
+              <a:t>Saturday 2.11.19</a:t>
+            </a:r>
+          </a:p>
+          <a:p>
+            <a:r>
+              <a:rPr lang="en-AU" sz="1400" b="1" dirty="0">
+                <a:solidFill>
+                  <a:schemeClr val="bg1">
+                    <a:lumMod val="85000"/>
+                  </a:schemeClr>
+                </a:solidFill>
+              </a:rPr>
+              <a:t>4 Hours</a:t>
+            </a:r>
+            <a:endParaRPr lang="en-AU" sz="1400" dirty="0">
+              <a:solidFill>
+                <a:schemeClr val="bg1">
+                  <a:lumMod val="85000"/>
+                </a:schemeClr>
+              </a:solidFill>
+            </a:endParaRPr>
+          </a:p>
+          <a:p>
+            <a:r>
+              <a:rPr lang="en-AU" sz="1400" dirty="0">
+                <a:solidFill>
+                  <a:schemeClr val="bg1">
+                    <a:lumMod val="85000"/>
+                  </a:schemeClr>
+                </a:solidFill>
+              </a:rPr>
+              <a:t>-Projectile</a:t>
+            </a:r>
+          </a:p>
+          <a:p>
+            <a:r>
+              <a:rPr lang="en-AU" sz="1400" dirty="0">
+                <a:solidFill>
+                  <a:schemeClr val="bg1">
+                    <a:lumMod val="85000"/>
+                  </a:schemeClr>
+                </a:solidFill>
+              </a:rPr>
+              <a:t>-Turret functionality</a:t>
+            </a:r>
+          </a:p>
+          <a:p>
+            <a:r>
+              <a:rPr lang="en-AU" sz="1400" dirty="0">
+                <a:solidFill>
+                  <a:schemeClr val="bg1">
+                    <a:lumMod val="85000"/>
+                  </a:schemeClr>
+                </a:solidFill>
+              </a:rPr>
+              <a:t>-Player build turret</a:t>
+            </a:r>
+          </a:p>
+          <a:p>
+            <a:r>
+              <a:rPr lang="en-AU" sz="1400" dirty="0">
+                <a:solidFill>
+                  <a:schemeClr val="bg1">
+                    <a:lumMod val="85000"/>
+                  </a:schemeClr>
+                </a:solidFill>
+              </a:rPr>
+              <a:t>-New enemy type (large zombie)</a:t>
+            </a:r>
+          </a:p>
+          <a:p>
+            <a:r>
+              <a:rPr lang="en-AU" sz="1400" dirty="0">
+                <a:solidFill>
+                  <a:schemeClr val="bg1">
+                    <a:lumMod val="85000"/>
+                  </a:schemeClr>
+                </a:solidFill>
+              </a:rPr>
+              <a:t>-UI setup</a:t>
+            </a:r>
+          </a:p>
+          <a:p>
+            <a:r>
+              <a:rPr lang="en-AU" sz="1400" dirty="0">
+                <a:solidFill>
+                  <a:schemeClr val="bg1">
+                    <a:lumMod val="85000"/>
+                  </a:schemeClr>
+                </a:solidFill>
+              </a:rPr>
+              <a:t>-Spawn enemy setup</a:t>
+            </a:r>
+          </a:p>
+        </p:txBody>
+      </p:sp>
+      <p:sp>
+        <p:nvSpPr>
+          <p:cNvPr id="9" name="TextBox 8">
+            <a:extLst>
+              <a:ext uri="{FF2B5EF4-FFF2-40B4-BE49-F238E27FC236}">
+                <a16:creationId xmlns:a16="http://schemas.microsoft.com/office/drawing/2014/main" id="{E3BFC49F-CE6D-4A5F-8037-1DA390FBF843}"/>
+              </a:ext>
+            </a:extLst>
+          </p:cNvPr>
+          <p:cNvSpPr txBox="1"/>
+          <p:nvPr/>
+        </p:nvSpPr>
+        <p:spPr>
+          <a:xfrm>
+            <a:off x="302629" y="3077878"/>
+            <a:ext cx="2478672" cy="1815882"/>
+          </a:xfrm>
+          <a:prstGeom prst="rect">
+            <a:avLst/>
+          </a:prstGeom>
+          <a:noFill/>
+        </p:spPr>
+        <p:txBody>
+          <a:bodyPr wrap="square" rtlCol="0">
+            <a:spAutoFit/>
+          </a:bodyPr>
+          <a:lstStyle/>
+          <a:p>
+            <a:r>
+              <a:rPr lang="en-AU" sz="1400" dirty="0">
+                <a:solidFill>
+                  <a:schemeClr val="bg1">
+                    <a:lumMod val="85000"/>
+                  </a:schemeClr>
+                </a:solidFill>
+              </a:rPr>
+              <a:t>Monday 4.11.19</a:t>
+            </a:r>
+          </a:p>
+          <a:p>
+            <a:pPr marL="285750" indent="-285750">
+              <a:buFontTx/>
+              <a:buChar char="-"/>
+            </a:pPr>
+            <a:r>
+              <a:rPr lang="en-AU" sz="1400" dirty="0">
+                <a:solidFill>
+                  <a:schemeClr val="bg1">
+                    <a:lumMod val="85000"/>
+                  </a:schemeClr>
+                </a:solidFill>
+              </a:rPr>
+              <a:t>Enemy base class setup w/ components</a:t>
+            </a:r>
+          </a:p>
+          <a:p>
+            <a:pPr marL="285750" indent="-285750">
+              <a:buFontTx/>
+              <a:buChar char="-"/>
+            </a:pPr>
+            <a:r>
+              <a:rPr lang="en-AU" sz="1400" dirty="0">
+                <a:solidFill>
+                  <a:schemeClr val="bg1">
+                    <a:lumMod val="85000"/>
+                  </a:schemeClr>
+                </a:solidFill>
+              </a:rPr>
+              <a:t>Enemy spawn behaviour</a:t>
+            </a:r>
+          </a:p>
+          <a:p>
+            <a:pPr marL="285750" indent="-285750">
+              <a:buFontTx/>
+              <a:buChar char="-"/>
+            </a:pPr>
+            <a:r>
+              <a:rPr lang="en-AU" sz="1400" dirty="0">
+                <a:solidFill>
+                  <a:schemeClr val="bg1">
+                    <a:lumMod val="85000"/>
+                  </a:schemeClr>
+                </a:solidFill>
+              </a:rPr>
+              <a:t>Enemy retargeting</a:t>
+            </a:r>
+          </a:p>
+          <a:p>
+            <a:pPr marL="285750" indent="-285750">
+              <a:buFontTx/>
+              <a:buChar char="-"/>
+            </a:pPr>
+            <a:r>
+              <a:rPr lang="en-AU" sz="1400" dirty="0">
+                <a:solidFill>
+                  <a:schemeClr val="bg1">
+                    <a:lumMod val="85000"/>
+                  </a:schemeClr>
+                </a:solidFill>
+              </a:rPr>
+              <a:t>Turret destroy</a:t>
+            </a:r>
+          </a:p>
+          <a:p>
+            <a:pPr marL="285750" indent="-285750">
+              <a:buFontTx/>
+              <a:buChar char="-"/>
+            </a:pPr>
+            <a:r>
+              <a:rPr lang="en-AU" sz="1400" dirty="0">
+                <a:solidFill>
+                  <a:schemeClr val="bg1">
+                    <a:lumMod val="85000"/>
+                  </a:schemeClr>
+                </a:solidFill>
+              </a:rPr>
+              <a:t>Turret lifespan</a:t>
+            </a:r>
+          </a:p>
+          <a:p>
+            <a:pPr marL="285750" indent="-285750">
+              <a:buFontTx/>
+              <a:buChar char="-"/>
+            </a:pPr>
+            <a:r>
+              <a:rPr lang="en-AU" sz="1400" dirty="0">
+                <a:solidFill>
+                  <a:schemeClr val="bg1">
+                    <a:lumMod val="85000"/>
+                  </a:schemeClr>
+                </a:solidFill>
+              </a:rPr>
+              <a:t>Level Design</a:t>
+            </a:r>
+          </a:p>
+        </p:txBody>
+      </p:sp>
+      <p:sp>
+        <p:nvSpPr>
+          <p:cNvPr id="10" name="TextBox 9">
+            <a:extLst>
+              <a:ext uri="{FF2B5EF4-FFF2-40B4-BE49-F238E27FC236}">
+                <a16:creationId xmlns:a16="http://schemas.microsoft.com/office/drawing/2014/main" id="{F5EAE52C-814F-4F8F-94A5-F639CA9EA642}"/>
+              </a:ext>
+            </a:extLst>
+          </p:cNvPr>
+          <p:cNvSpPr txBox="1"/>
+          <p:nvPr/>
+        </p:nvSpPr>
+        <p:spPr>
+          <a:xfrm>
+            <a:off x="2869154" y="3098231"/>
+            <a:ext cx="2379121" cy="1384995"/>
+          </a:xfrm>
+          <a:prstGeom prst="rect">
+            <a:avLst/>
+          </a:prstGeom>
+          <a:noFill/>
+        </p:spPr>
+        <p:txBody>
+          <a:bodyPr wrap="square" rtlCol="0">
+            <a:spAutoFit/>
+          </a:bodyPr>
+          <a:lstStyle/>
+          <a:p>
+            <a:r>
+              <a:rPr lang="en-AU" sz="1400" dirty="0">
+                <a:solidFill>
+                  <a:schemeClr val="bg1">
+                    <a:lumMod val="85000"/>
+                  </a:schemeClr>
+                </a:solidFill>
+              </a:rPr>
+              <a:t>Tuesday 5.11.19</a:t>
+            </a:r>
+          </a:p>
+          <a:p>
+            <a:pPr marL="285750" indent="-285750">
+              <a:buFontTx/>
+              <a:buChar char="-"/>
+            </a:pPr>
+            <a:r>
+              <a:rPr lang="en-AU" sz="1400" dirty="0">
+                <a:solidFill>
+                  <a:schemeClr val="bg1">
+                    <a:lumMod val="85000"/>
+                  </a:schemeClr>
+                </a:solidFill>
+              </a:rPr>
+              <a:t>End game UI</a:t>
+            </a:r>
+          </a:p>
+          <a:p>
+            <a:pPr marL="285750" indent="-285750">
+              <a:buFontTx/>
+              <a:buChar char="-"/>
+            </a:pPr>
+            <a:r>
+              <a:rPr lang="en-AU" sz="1400" dirty="0">
+                <a:solidFill>
+                  <a:schemeClr val="bg1">
+                    <a:lumMod val="85000"/>
+                  </a:schemeClr>
+                </a:solidFill>
+              </a:rPr>
+              <a:t>Start game UI</a:t>
+            </a:r>
+          </a:p>
+          <a:p>
+            <a:pPr marL="285750" indent="-285750">
+              <a:buFontTx/>
+              <a:buChar char="-"/>
+            </a:pPr>
+            <a:r>
+              <a:rPr lang="en-AU" sz="1400" dirty="0">
+                <a:solidFill>
+                  <a:schemeClr val="bg1">
+                    <a:lumMod val="85000"/>
+                  </a:schemeClr>
+                </a:solidFill>
+              </a:rPr>
+              <a:t>Level Design</a:t>
+            </a:r>
+          </a:p>
+          <a:p>
+            <a:pPr marL="285750" indent="-285750">
+              <a:buFontTx/>
+              <a:buChar char="-"/>
+            </a:pPr>
+            <a:r>
+              <a:rPr lang="en-AU" sz="1400" dirty="0">
+                <a:solidFill>
+                  <a:schemeClr val="bg1">
+                    <a:lumMod val="85000"/>
+                  </a:schemeClr>
+                </a:solidFill>
+              </a:rPr>
+              <a:t>Resource spawn</a:t>
+            </a:r>
+          </a:p>
+          <a:p>
+            <a:pPr marL="285750" indent="-285750">
+              <a:buFontTx/>
+              <a:buChar char="-"/>
+            </a:pPr>
+            <a:r>
+              <a:rPr lang="en-AU" sz="1400" dirty="0">
+                <a:solidFill>
+                  <a:schemeClr val="bg1">
+                    <a:lumMod val="85000"/>
+                  </a:schemeClr>
+                </a:solidFill>
+              </a:rPr>
+              <a:t>Player Traps</a:t>
+            </a:r>
+          </a:p>
+        </p:txBody>
+      </p:sp>
+      <p:sp>
+        <p:nvSpPr>
+          <p:cNvPr id="11" name="TextBox 10">
+            <a:extLst>
+              <a:ext uri="{FF2B5EF4-FFF2-40B4-BE49-F238E27FC236}">
+                <a16:creationId xmlns:a16="http://schemas.microsoft.com/office/drawing/2014/main" id="{8AF98AAC-96A1-468E-81E8-48F4F12F965D}"/>
+              </a:ext>
+            </a:extLst>
+          </p:cNvPr>
+          <p:cNvSpPr txBox="1"/>
+          <p:nvPr/>
+        </p:nvSpPr>
+        <p:spPr>
+          <a:xfrm>
+            <a:off x="5248275" y="3142859"/>
+            <a:ext cx="2379121" cy="1600438"/>
+          </a:xfrm>
+          <a:prstGeom prst="rect">
+            <a:avLst/>
+          </a:prstGeom>
+          <a:noFill/>
+        </p:spPr>
+        <p:txBody>
+          <a:bodyPr wrap="square" rtlCol="0">
+            <a:spAutoFit/>
+          </a:bodyPr>
+          <a:lstStyle/>
+          <a:p>
+            <a:r>
+              <a:rPr lang="en-AU" sz="1400" dirty="0">
+                <a:solidFill>
+                  <a:schemeClr val="bg1">
+                    <a:lumMod val="85000"/>
+                  </a:schemeClr>
+                </a:solidFill>
+              </a:rPr>
+              <a:t>Wednesday 6.11.19</a:t>
+            </a:r>
+          </a:p>
+          <a:p>
+            <a:pPr marL="285750" indent="-285750">
+              <a:buFontTx/>
+              <a:buChar char="-"/>
+            </a:pPr>
+            <a:r>
+              <a:rPr lang="en-AU" sz="1400" dirty="0">
+                <a:solidFill>
+                  <a:schemeClr val="bg1">
+                    <a:lumMod val="85000"/>
+                  </a:schemeClr>
+                </a:solidFill>
+              </a:rPr>
+              <a:t>Camera shakes</a:t>
+            </a:r>
+          </a:p>
+          <a:p>
+            <a:pPr marL="285750" indent="-285750">
+              <a:buFontTx/>
+              <a:buChar char="-"/>
+            </a:pPr>
+            <a:r>
+              <a:rPr lang="en-AU" sz="1400" dirty="0">
+                <a:solidFill>
+                  <a:schemeClr val="bg1">
+                    <a:lumMod val="85000"/>
+                  </a:schemeClr>
+                </a:solidFill>
+              </a:rPr>
+              <a:t>Level design</a:t>
+            </a:r>
+          </a:p>
+          <a:p>
+            <a:pPr marL="285750" indent="-285750">
+              <a:buFontTx/>
+              <a:buChar char="-"/>
+            </a:pPr>
+            <a:r>
+              <a:rPr lang="en-AU" sz="1400" dirty="0">
+                <a:solidFill>
+                  <a:schemeClr val="bg1">
+                    <a:lumMod val="85000"/>
+                  </a:schemeClr>
+                </a:solidFill>
+              </a:rPr>
+              <a:t>Playtests</a:t>
+            </a:r>
+          </a:p>
+          <a:p>
+            <a:pPr marL="285750" indent="-285750">
+              <a:buFontTx/>
+              <a:buChar char="-"/>
+            </a:pPr>
+            <a:r>
+              <a:rPr lang="en-AU" sz="1400" dirty="0">
+                <a:solidFill>
+                  <a:schemeClr val="bg1">
+                    <a:lumMod val="85000"/>
+                  </a:schemeClr>
+                </a:solidFill>
+              </a:rPr>
+              <a:t>UI additional work</a:t>
+            </a:r>
+          </a:p>
+          <a:p>
+            <a:pPr marL="285750" indent="-285750">
+              <a:buFontTx/>
+              <a:buChar char="-"/>
+            </a:pPr>
+            <a:endParaRPr lang="en-AU" sz="1400" dirty="0">
+              <a:solidFill>
+                <a:schemeClr val="bg1">
+                  <a:lumMod val="85000"/>
+                </a:schemeClr>
+              </a:solidFill>
+            </a:endParaRPr>
+          </a:p>
+          <a:p>
+            <a:pPr marL="285750" indent="-285750">
+              <a:buFontTx/>
+              <a:buChar char="-"/>
+            </a:pPr>
+            <a:endParaRPr lang="en-AU" sz="1400" dirty="0">
+              <a:solidFill>
+                <a:schemeClr val="bg1">
+                  <a:lumMod val="85000"/>
+                </a:schemeClr>
+              </a:solidFill>
+            </a:endParaRPr>
           </a:p>
         </p:txBody>
       </p:sp>

</xml_diff>

<commit_message>
Doc Update, ProtPoint and GMode restructure
</commit_message>
<xml_diff>
--- a/AliensVsZombieDocument.pptx
+++ b/AliensVsZombieDocument.pptx
@@ -262,7 +262,7 @@
           <a:p>
             <a:fld id="{FF8D5B93-4A56-43E3-B26B-02DC0C7CF848}" type="datetimeFigureOut">
               <a:rPr lang="en-AU" smtClean="0"/>
-              <a:t>3/11/2019</a:t>
+              <a:t>4/11/2019</a:t>
             </a:fld>
             <a:endParaRPr lang="en-AU"/>
           </a:p>
@@ -462,7 +462,7 @@
           <a:p>
             <a:fld id="{FF8D5B93-4A56-43E3-B26B-02DC0C7CF848}" type="datetimeFigureOut">
               <a:rPr lang="en-AU" smtClean="0"/>
-              <a:t>3/11/2019</a:t>
+              <a:t>4/11/2019</a:t>
             </a:fld>
             <a:endParaRPr lang="en-AU"/>
           </a:p>
@@ -672,7 +672,7 @@
           <a:p>
             <a:fld id="{FF8D5B93-4A56-43E3-B26B-02DC0C7CF848}" type="datetimeFigureOut">
               <a:rPr lang="en-AU" smtClean="0"/>
-              <a:t>3/11/2019</a:t>
+              <a:t>4/11/2019</a:t>
             </a:fld>
             <a:endParaRPr lang="en-AU"/>
           </a:p>
@@ -872,7 +872,7 @@
           <a:p>
             <a:fld id="{FF8D5B93-4A56-43E3-B26B-02DC0C7CF848}" type="datetimeFigureOut">
               <a:rPr lang="en-AU" smtClean="0"/>
-              <a:t>3/11/2019</a:t>
+              <a:t>4/11/2019</a:t>
             </a:fld>
             <a:endParaRPr lang="en-AU"/>
           </a:p>
@@ -1148,7 +1148,7 @@
           <a:p>
             <a:fld id="{FF8D5B93-4A56-43E3-B26B-02DC0C7CF848}" type="datetimeFigureOut">
               <a:rPr lang="en-AU" smtClean="0"/>
-              <a:t>3/11/2019</a:t>
+              <a:t>4/11/2019</a:t>
             </a:fld>
             <a:endParaRPr lang="en-AU"/>
           </a:p>
@@ -1416,7 +1416,7 @@
           <a:p>
             <a:fld id="{FF8D5B93-4A56-43E3-B26B-02DC0C7CF848}" type="datetimeFigureOut">
               <a:rPr lang="en-AU" smtClean="0"/>
-              <a:t>3/11/2019</a:t>
+              <a:t>4/11/2019</a:t>
             </a:fld>
             <a:endParaRPr lang="en-AU"/>
           </a:p>
@@ -1831,7 +1831,7 @@
           <a:p>
             <a:fld id="{FF8D5B93-4A56-43E3-B26B-02DC0C7CF848}" type="datetimeFigureOut">
               <a:rPr lang="en-AU" smtClean="0"/>
-              <a:t>3/11/2019</a:t>
+              <a:t>4/11/2019</a:t>
             </a:fld>
             <a:endParaRPr lang="en-AU"/>
           </a:p>
@@ -1973,7 +1973,7 @@
           <a:p>
             <a:fld id="{FF8D5B93-4A56-43E3-B26B-02DC0C7CF848}" type="datetimeFigureOut">
               <a:rPr lang="en-AU" smtClean="0"/>
-              <a:t>3/11/2019</a:t>
+              <a:t>4/11/2019</a:t>
             </a:fld>
             <a:endParaRPr lang="en-AU"/>
           </a:p>
@@ -2086,7 +2086,7 @@
           <a:p>
             <a:fld id="{FF8D5B93-4A56-43E3-B26B-02DC0C7CF848}" type="datetimeFigureOut">
               <a:rPr lang="en-AU" smtClean="0"/>
-              <a:t>3/11/2019</a:t>
+              <a:t>4/11/2019</a:t>
             </a:fld>
             <a:endParaRPr lang="en-AU"/>
           </a:p>
@@ -2399,7 +2399,7 @@
           <a:p>
             <a:fld id="{FF8D5B93-4A56-43E3-B26B-02DC0C7CF848}" type="datetimeFigureOut">
               <a:rPr lang="en-AU" smtClean="0"/>
-              <a:t>3/11/2019</a:t>
+              <a:t>4/11/2019</a:t>
             </a:fld>
             <a:endParaRPr lang="en-AU"/>
           </a:p>
@@ -2688,7 +2688,7 @@
           <a:p>
             <a:fld id="{FF8D5B93-4A56-43E3-B26B-02DC0C7CF848}" type="datetimeFigureOut">
               <a:rPr lang="en-AU" smtClean="0"/>
-              <a:t>3/11/2019</a:t>
+              <a:t>4/11/2019</a:t>
             </a:fld>
             <a:endParaRPr lang="en-AU"/>
           </a:p>
@@ -2931,7 +2931,7 @@
           <a:p>
             <a:fld id="{FF8D5B93-4A56-43E3-B26B-02DC0C7CF848}" type="datetimeFigureOut">
               <a:rPr lang="en-AU" smtClean="0"/>
-              <a:t>3/11/2019</a:t>
+              <a:t>4/11/2019</a:t>
             </a:fld>
             <a:endParaRPr lang="en-AU"/>
           </a:p>
@@ -4092,7 +4092,7 @@
         <p:spPr>
           <a:xfrm>
             <a:off x="302629" y="3077878"/>
-            <a:ext cx="2478672" cy="1815882"/>
+            <a:ext cx="2478672" cy="2462213"/>
           </a:xfrm>
           <a:prstGeom prst="rect">
             <a:avLst/>
@@ -4117,6 +4117,18 @@
             </a:r>
           </a:p>
           <a:p>
+            <a:r>
+              <a:rPr lang="en-AU" sz="1400" b="1" dirty="0">
+                <a:solidFill>
+                  <a:schemeClr val="bg1">
+                    <a:lumMod val="85000"/>
+                  </a:schemeClr>
+                </a:solidFill>
+              </a:rPr>
+              <a:t>4-5 Hours</a:t>
+            </a:r>
+          </a:p>
+          <a:p>
             <a:pPr marL="285750" indent="-285750">
               <a:buFontTx/>
               <a:buChar char="-"/>
@@ -4209,7 +4221,23 @@
                   </a:schemeClr>
                 </a:solidFill>
               </a:rPr>
-              <a:t>Level Design</a:t>
+              <a:t>Protection Point and Game Mode code Restructure</a:t>
+            </a:r>
+          </a:p>
+          <a:p>
+            <a:pPr marL="285750" indent="-285750">
+              <a:buFontTx/>
+              <a:buChar char="-"/>
+            </a:pPr>
+            <a:r>
+              <a:rPr lang="en-AU" sz="1400" dirty="0">
+                <a:solidFill>
+                  <a:schemeClr val="bg1">
+                    <a:lumMod val="85000"/>
+                  </a:schemeClr>
+                </a:solidFill>
+              </a:rPr>
+              <a:t>General debugging</a:t>
             </a:r>
           </a:p>
         </p:txBody>

</xml_diff>

<commit_message>
Player movement restriction + spawner change + level design
</commit_message>
<xml_diff>
--- a/AliensVsZombieDocument.pptx
+++ b/AliensVsZombieDocument.pptx
@@ -4092,7 +4092,7 @@
         <p:spPr>
           <a:xfrm>
             <a:off x="302629" y="3077878"/>
-            <a:ext cx="2478672" cy="2462213"/>
+            <a:ext cx="2478672" cy="3323987"/>
           </a:xfrm>
           <a:prstGeom prst="rect">
             <a:avLst/>
@@ -4221,7 +4221,7 @@
                   </a:schemeClr>
                 </a:solidFill>
               </a:rPr>
-              <a:t>Protection Point and Game Mode code Restructure</a:t>
+              <a:t>Resource spawn</a:t>
             </a:r>
           </a:p>
           <a:p>
@@ -4237,6 +4237,54 @@
                   </a:schemeClr>
                 </a:solidFill>
               </a:rPr>
+              <a:t>Protection Point and Game Mode code Restructure</a:t>
+            </a:r>
+          </a:p>
+          <a:p>
+            <a:pPr marL="285750" indent="-285750">
+              <a:buFontTx/>
+              <a:buChar char="-"/>
+            </a:pPr>
+            <a:r>
+              <a:rPr lang="en-AU" sz="1400" dirty="0">
+                <a:solidFill>
+                  <a:schemeClr val="bg1">
+                    <a:lumMod val="85000"/>
+                  </a:schemeClr>
+                </a:solidFill>
+              </a:rPr>
+              <a:t>Player movement restriction</a:t>
+            </a:r>
+          </a:p>
+          <a:p>
+            <a:pPr marL="285750" indent="-285750">
+              <a:buFontTx/>
+              <a:buChar char="-"/>
+            </a:pPr>
+            <a:r>
+              <a:rPr lang="en-AU" sz="1400" dirty="0">
+                <a:solidFill>
+                  <a:schemeClr val="bg1">
+                    <a:lumMod val="85000"/>
+                  </a:schemeClr>
+                </a:solidFill>
+              </a:rPr>
+              <a:t>Level design</a:t>
+            </a:r>
+          </a:p>
+          <a:p>
+            <a:pPr marL="285750" indent="-285750">
+              <a:buFontTx/>
+              <a:buChar char="-"/>
+            </a:pPr>
+            <a:r>
+              <a:rPr lang="en-AU" sz="1400" dirty="0">
+                <a:solidFill>
+                  <a:schemeClr val="bg1">
+                    <a:lumMod val="85000"/>
+                  </a:schemeClr>
+                </a:solidFill>
+              </a:rPr>
               <a:t>General debugging</a:t>
             </a:r>
           </a:p>
@@ -4257,7 +4305,7 @@
         <p:spPr>
           <a:xfrm>
             <a:off x="2869154" y="3098231"/>
-            <a:ext cx="2379121" cy="1384995"/>
+            <a:ext cx="2379121" cy="1169551"/>
           </a:xfrm>
           <a:prstGeom prst="rect">
             <a:avLst/>
@@ -4327,22 +4375,6 @@
                 </a:solidFill>
               </a:rPr>
               <a:t>Level Design</a:t>
-            </a:r>
-          </a:p>
-          <a:p>
-            <a:pPr marL="285750" indent="-285750">
-              <a:buFontTx/>
-              <a:buChar char="-"/>
-            </a:pPr>
-            <a:r>
-              <a:rPr lang="en-AU" sz="1400" dirty="0">
-                <a:solidFill>
-                  <a:schemeClr val="bg1">
-                    <a:lumMod val="85000"/>
-                  </a:schemeClr>
-                </a:solidFill>
-              </a:rPr>
-              <a:t>Resource spawn</a:t>
             </a:r>
           </a:p>
           <a:p>

</xml_diff>

<commit_message>
Document update + map updates + value tweaks
</commit_message>
<xml_diff>
--- a/AliensVsZombieDocument.pptx
+++ b/AliensVsZombieDocument.pptx
@@ -262,7 +262,7 @@
           <a:p>
             <a:fld id="{FF8D5B93-4A56-43E3-B26B-02DC0C7CF848}" type="datetimeFigureOut">
               <a:rPr lang="en-AU" smtClean="0"/>
-              <a:t>7/11/2019</a:t>
+              <a:t>9/11/2019</a:t>
             </a:fld>
             <a:endParaRPr lang="en-AU"/>
           </a:p>
@@ -462,7 +462,7 @@
           <a:p>
             <a:fld id="{FF8D5B93-4A56-43E3-B26B-02DC0C7CF848}" type="datetimeFigureOut">
               <a:rPr lang="en-AU" smtClean="0"/>
-              <a:t>7/11/2019</a:t>
+              <a:t>9/11/2019</a:t>
             </a:fld>
             <a:endParaRPr lang="en-AU"/>
           </a:p>
@@ -672,7 +672,7 @@
           <a:p>
             <a:fld id="{FF8D5B93-4A56-43E3-B26B-02DC0C7CF848}" type="datetimeFigureOut">
               <a:rPr lang="en-AU" smtClean="0"/>
-              <a:t>7/11/2019</a:t>
+              <a:t>9/11/2019</a:t>
             </a:fld>
             <a:endParaRPr lang="en-AU"/>
           </a:p>
@@ -872,7 +872,7 @@
           <a:p>
             <a:fld id="{FF8D5B93-4A56-43E3-B26B-02DC0C7CF848}" type="datetimeFigureOut">
               <a:rPr lang="en-AU" smtClean="0"/>
-              <a:t>7/11/2019</a:t>
+              <a:t>9/11/2019</a:t>
             </a:fld>
             <a:endParaRPr lang="en-AU"/>
           </a:p>
@@ -1148,7 +1148,7 @@
           <a:p>
             <a:fld id="{FF8D5B93-4A56-43E3-B26B-02DC0C7CF848}" type="datetimeFigureOut">
               <a:rPr lang="en-AU" smtClean="0"/>
-              <a:t>7/11/2019</a:t>
+              <a:t>9/11/2019</a:t>
             </a:fld>
             <a:endParaRPr lang="en-AU"/>
           </a:p>
@@ -1416,7 +1416,7 @@
           <a:p>
             <a:fld id="{FF8D5B93-4A56-43E3-B26B-02DC0C7CF848}" type="datetimeFigureOut">
               <a:rPr lang="en-AU" smtClean="0"/>
-              <a:t>7/11/2019</a:t>
+              <a:t>9/11/2019</a:t>
             </a:fld>
             <a:endParaRPr lang="en-AU"/>
           </a:p>
@@ -1831,7 +1831,7 @@
           <a:p>
             <a:fld id="{FF8D5B93-4A56-43E3-B26B-02DC0C7CF848}" type="datetimeFigureOut">
               <a:rPr lang="en-AU" smtClean="0"/>
-              <a:t>7/11/2019</a:t>
+              <a:t>9/11/2019</a:t>
             </a:fld>
             <a:endParaRPr lang="en-AU"/>
           </a:p>
@@ -1973,7 +1973,7 @@
           <a:p>
             <a:fld id="{FF8D5B93-4A56-43E3-B26B-02DC0C7CF848}" type="datetimeFigureOut">
               <a:rPr lang="en-AU" smtClean="0"/>
-              <a:t>7/11/2019</a:t>
+              <a:t>9/11/2019</a:t>
             </a:fld>
             <a:endParaRPr lang="en-AU"/>
           </a:p>
@@ -2086,7 +2086,7 @@
           <a:p>
             <a:fld id="{FF8D5B93-4A56-43E3-B26B-02DC0C7CF848}" type="datetimeFigureOut">
               <a:rPr lang="en-AU" smtClean="0"/>
-              <a:t>7/11/2019</a:t>
+              <a:t>9/11/2019</a:t>
             </a:fld>
             <a:endParaRPr lang="en-AU"/>
           </a:p>
@@ -2399,7 +2399,7 @@
           <a:p>
             <a:fld id="{FF8D5B93-4A56-43E3-B26B-02DC0C7CF848}" type="datetimeFigureOut">
               <a:rPr lang="en-AU" smtClean="0"/>
-              <a:t>7/11/2019</a:t>
+              <a:t>9/11/2019</a:t>
             </a:fld>
             <a:endParaRPr lang="en-AU"/>
           </a:p>
@@ -2688,7 +2688,7 @@
           <a:p>
             <a:fld id="{FF8D5B93-4A56-43E3-B26B-02DC0C7CF848}" type="datetimeFigureOut">
               <a:rPr lang="en-AU" smtClean="0"/>
-              <a:t>7/11/2019</a:t>
+              <a:t>9/11/2019</a:t>
             </a:fld>
             <a:endParaRPr lang="en-AU"/>
           </a:p>
@@ -2931,7 +2931,7 @@
           <a:p>
             <a:fld id="{FF8D5B93-4A56-43E3-B26B-02DC0C7CF848}" type="datetimeFigureOut">
               <a:rPr lang="en-AU" smtClean="0"/>
-              <a:t>7/11/2019</a:t>
+              <a:t>9/11/2019</a:t>
             </a:fld>
             <a:endParaRPr lang="en-AU"/>
           </a:p>
@@ -3577,7 +3577,7 @@
         <p:spPr>
           <a:xfrm>
             <a:off x="302628" y="1261996"/>
-            <a:ext cx="2293641" cy="1600438"/>
+            <a:ext cx="1965282" cy="1169551"/>
           </a:xfrm>
           <a:prstGeom prst="rect">
             <a:avLst/>
@@ -3658,39 +3658,7 @@
                   </a:schemeClr>
                 </a:solidFill>
               </a:rPr>
-              <a:t>Game Mode setup</a:t>
-            </a:r>
-          </a:p>
-          <a:p>
-            <a:pPr marL="285750" indent="-285750">
-              <a:buFontTx/>
-              <a:buChar char="-"/>
-            </a:pPr>
-            <a:r>
-              <a:rPr lang="en-AU" sz="1400" dirty="0">
-                <a:solidFill>
-                  <a:schemeClr val="bg1">
-                    <a:lumMod val="85000"/>
-                  </a:schemeClr>
-                </a:solidFill>
-              </a:rPr>
-              <a:t>Basic materials</a:t>
-            </a:r>
-          </a:p>
-          <a:p>
-            <a:pPr marL="285750" indent="-285750">
-              <a:buFontTx/>
-              <a:buChar char="-"/>
-            </a:pPr>
-            <a:r>
-              <a:rPr lang="en-AU" sz="1400" dirty="0">
-                <a:solidFill>
-                  <a:schemeClr val="bg1">
-                    <a:lumMod val="85000"/>
-                  </a:schemeClr>
-                </a:solidFill>
-              </a:rPr>
-              <a:t>Overall project structure</a:t>
+              <a:t>Project structure</a:t>
             </a:r>
           </a:p>
         </p:txBody>
@@ -3709,8 +3677,8 @@
         </p:nvSpPr>
         <p:spPr>
           <a:xfrm>
-            <a:off x="2869155" y="1261996"/>
-            <a:ext cx="2541045" cy="1600438"/>
+            <a:off x="3009833" y="1267501"/>
+            <a:ext cx="2541045" cy="1169551"/>
           </a:xfrm>
           <a:prstGeom prst="rect">
             <a:avLst/>
@@ -3759,7 +3727,7 @@
                   </a:schemeClr>
                 </a:solidFill>
               </a:rPr>
-              <a:t>Laser and Pull beam</a:t>
+              <a:t>Player Functionality</a:t>
             </a:r>
           </a:p>
           <a:p>
@@ -3775,7 +3743,7 @@
                   </a:schemeClr>
                 </a:solidFill>
               </a:rPr>
-              <a:t>Resource Obj</a:t>
+              <a:t>Pickups</a:t>
             </a:r>
           </a:p>
           <a:p>
@@ -3791,39 +3759,7 @@
                   </a:schemeClr>
                 </a:solidFill>
               </a:rPr>
-              <a:t>Player Functionality</a:t>
-            </a:r>
-          </a:p>
-          <a:p>
-            <a:pPr marL="457200" indent="-457200">
-              <a:buFontTx/>
-              <a:buChar char="-"/>
-            </a:pPr>
-            <a:r>
-              <a:rPr lang="en-AU" sz="1400" dirty="0">
-                <a:solidFill>
-                  <a:schemeClr val="bg1">
-                    <a:lumMod val="85000"/>
-                  </a:schemeClr>
-                </a:solidFill>
-              </a:rPr>
-              <a:t>Enemy object detection</a:t>
-            </a:r>
-          </a:p>
-          <a:p>
-            <a:pPr marL="457200" indent="-457200">
-              <a:buFontTx/>
-              <a:buChar char="-"/>
-            </a:pPr>
-            <a:r>
-              <a:rPr lang="en-AU" sz="1400" dirty="0">
-                <a:solidFill>
-                  <a:schemeClr val="bg1">
-                    <a:lumMod val="85000"/>
-                  </a:schemeClr>
-                </a:solidFill>
-              </a:rPr>
-              <a:t>Component setup</a:t>
+              <a:t>Components setup</a:t>
             </a:r>
           </a:p>
         </p:txBody>
@@ -3842,8 +3778,8 @@
         </p:nvSpPr>
         <p:spPr>
           <a:xfrm>
-            <a:off x="5248276" y="1252395"/>
-            <a:ext cx="3007807" cy="1815882"/>
+            <a:off x="5530751" y="1257900"/>
+            <a:ext cx="3007807" cy="1384995"/>
           </a:xfrm>
           <a:prstGeom prst="rect">
             <a:avLst/>
@@ -3892,7 +3828,7 @@
                   </a:schemeClr>
                 </a:solidFill>
               </a:rPr>
-              <a:t>Enemy functionality set up into components</a:t>
+              <a:t>Enemy functionality</a:t>
             </a:r>
           </a:p>
           <a:p>
@@ -3908,7 +3844,7 @@
                   </a:schemeClr>
                 </a:solidFill>
               </a:rPr>
-              <a:t>Enemy attacking Protection area</a:t>
+              <a:t>Game end and restart</a:t>
             </a:r>
           </a:p>
           <a:p>
@@ -3924,8 +3860,68 @@
                   </a:schemeClr>
                 </a:solidFill>
               </a:rPr>
-              <a:t>Game end and restart state</a:t>
-            </a:r>
+              <a:t>Quaternion Rotation problem solving (unsolved)</a:t>
+            </a:r>
+          </a:p>
+        </p:txBody>
+      </p:sp>
+      <p:sp>
+        <p:nvSpPr>
+          <p:cNvPr id="8" name="TextBox 7">
+            <a:extLst>
+              <a:ext uri="{FF2B5EF4-FFF2-40B4-BE49-F238E27FC236}">
+                <a16:creationId xmlns:a16="http://schemas.microsoft.com/office/drawing/2014/main" id="{A7DEF71E-7A7B-4439-B04D-954A3E9D803B}"/>
+              </a:ext>
+            </a:extLst>
+          </p:cNvPr>
+          <p:cNvSpPr txBox="1"/>
+          <p:nvPr/>
+        </p:nvSpPr>
+        <p:spPr>
+          <a:xfrm>
+            <a:off x="8291985" y="1257900"/>
+            <a:ext cx="3292547" cy="1384995"/>
+          </a:xfrm>
+          <a:prstGeom prst="rect">
+            <a:avLst/>
+          </a:prstGeom>
+          <a:noFill/>
+        </p:spPr>
+        <p:txBody>
+          <a:bodyPr wrap="square" rtlCol="0">
+            <a:spAutoFit/>
+          </a:bodyPr>
+          <a:lstStyle/>
+          <a:p>
+            <a:r>
+              <a:rPr lang="en-AU" sz="1400" dirty="0">
+                <a:solidFill>
+                  <a:schemeClr val="bg1">
+                    <a:lumMod val="85000"/>
+                  </a:schemeClr>
+                </a:solidFill>
+              </a:rPr>
+              <a:t>Saturday 2.11.19</a:t>
+            </a:r>
+          </a:p>
+          <a:p>
+            <a:r>
+              <a:rPr lang="en-AU" sz="1400" b="1" dirty="0">
+                <a:solidFill>
+                  <a:schemeClr val="bg1">
+                    <a:lumMod val="85000"/>
+                  </a:schemeClr>
+                </a:solidFill>
+              </a:rPr>
+              <a:t>4 Hours</a:t>
+            </a:r>
+            <a:endParaRPr lang="en-AU" sz="1400" dirty="0">
+              <a:solidFill>
+                <a:schemeClr val="bg1">
+                  <a:lumMod val="85000"/>
+                </a:schemeClr>
+              </a:solidFill>
+            </a:endParaRPr>
           </a:p>
           <a:p>
             <a:pPr marL="285750" indent="-285750">
@@ -3940,17 +3936,65 @@
                   </a:schemeClr>
                 </a:solidFill>
               </a:rPr>
-              <a:t>Quaternion Rotation problem solving (unsolved)</a:t>
-            </a:r>
-          </a:p>
-        </p:txBody>
-      </p:sp>
-      <p:sp>
-        <p:nvSpPr>
-          <p:cNvPr id="8" name="TextBox 7">
-            <a:extLst>
-              <a:ext uri="{FF2B5EF4-FFF2-40B4-BE49-F238E27FC236}">
-                <a16:creationId xmlns:a16="http://schemas.microsoft.com/office/drawing/2014/main" id="{A7DEF71E-7A7B-4439-B04D-954A3E9D803B}"/>
+              <a:t>Turrets</a:t>
+            </a:r>
+          </a:p>
+          <a:p>
+            <a:pPr marL="285750" indent="-285750">
+              <a:buFontTx/>
+              <a:buChar char="-"/>
+            </a:pPr>
+            <a:r>
+              <a:rPr lang="en-AU" sz="1400" dirty="0">
+                <a:solidFill>
+                  <a:schemeClr val="bg1">
+                    <a:lumMod val="85000"/>
+                  </a:schemeClr>
+                </a:solidFill>
+              </a:rPr>
+              <a:t>New enemy type </a:t>
+            </a:r>
+          </a:p>
+          <a:p>
+            <a:pPr marL="285750" indent="-285750">
+              <a:buFontTx/>
+              <a:buChar char="-"/>
+            </a:pPr>
+            <a:r>
+              <a:rPr lang="en-AU" sz="1400" dirty="0">
+                <a:solidFill>
+                  <a:schemeClr val="bg1">
+                    <a:lumMod val="85000"/>
+                  </a:schemeClr>
+                </a:solidFill>
+              </a:rPr>
+              <a:t>UI setup</a:t>
+            </a:r>
+          </a:p>
+          <a:p>
+            <a:pPr marL="285750" indent="-285750">
+              <a:buFontTx/>
+              <a:buChar char="-"/>
+            </a:pPr>
+            <a:r>
+              <a:rPr lang="en-AU" sz="1400" dirty="0">
+                <a:solidFill>
+                  <a:schemeClr val="bg1">
+                    <a:lumMod val="85000"/>
+                  </a:schemeClr>
+                </a:solidFill>
+              </a:rPr>
+              <a:t>Spawn enemy setup</a:t>
+            </a:r>
+          </a:p>
+        </p:txBody>
+      </p:sp>
+      <p:sp>
+        <p:nvSpPr>
+          <p:cNvPr id="9" name="TextBox 8">
+            <a:extLst>
+              <a:ext uri="{FF2B5EF4-FFF2-40B4-BE49-F238E27FC236}">
+                <a16:creationId xmlns:a16="http://schemas.microsoft.com/office/drawing/2014/main" id="{E3BFC49F-CE6D-4A5F-8037-1DA390FBF843}"/>
               </a:ext>
             </a:extLst>
           </p:cNvPr>
@@ -3959,7 +4003,296 @@
         </p:nvSpPr>
         <p:spPr>
           <a:xfrm>
-            <a:off x="8151307" y="1252395"/>
+            <a:off x="302628" y="2711972"/>
+            <a:ext cx="2478672" cy="1815882"/>
+          </a:xfrm>
+          <a:prstGeom prst="rect">
+            <a:avLst/>
+          </a:prstGeom>
+          <a:noFill/>
+        </p:spPr>
+        <p:txBody>
+          <a:bodyPr wrap="square" rtlCol="0">
+            <a:spAutoFit/>
+          </a:bodyPr>
+          <a:lstStyle/>
+          <a:p>
+            <a:r>
+              <a:rPr lang="en-AU" sz="1400" dirty="0">
+                <a:solidFill>
+                  <a:schemeClr val="bg1">
+                    <a:lumMod val="85000"/>
+                  </a:schemeClr>
+                </a:solidFill>
+              </a:rPr>
+              <a:t>Monday 4.11.19</a:t>
+            </a:r>
+          </a:p>
+          <a:p>
+            <a:r>
+              <a:rPr lang="en-AU" sz="1400" b="1" dirty="0">
+                <a:solidFill>
+                  <a:schemeClr val="bg1">
+                    <a:lumMod val="85000"/>
+                  </a:schemeClr>
+                </a:solidFill>
+              </a:rPr>
+              <a:t>4 ½ Hours</a:t>
+            </a:r>
+          </a:p>
+          <a:p>
+            <a:pPr marL="285750" indent="-285750">
+              <a:buFontTx/>
+              <a:buChar char="-"/>
+            </a:pPr>
+            <a:r>
+              <a:rPr lang="en-AU" sz="1400" dirty="0">
+                <a:solidFill>
+                  <a:schemeClr val="bg1">
+                    <a:lumMod val="85000"/>
+                  </a:schemeClr>
+                </a:solidFill>
+              </a:rPr>
+              <a:t>Code Refactoring</a:t>
+            </a:r>
+          </a:p>
+          <a:p>
+            <a:pPr marL="285750" indent="-285750">
+              <a:buFontTx/>
+              <a:buChar char="-"/>
+            </a:pPr>
+            <a:r>
+              <a:rPr lang="en-AU" sz="1400" dirty="0">
+                <a:solidFill>
+                  <a:schemeClr val="bg1">
+                    <a:lumMod val="85000"/>
+                  </a:schemeClr>
+                </a:solidFill>
+              </a:rPr>
+              <a:t>Turret Debugging</a:t>
+            </a:r>
+          </a:p>
+          <a:p>
+            <a:pPr marL="285750" indent="-285750">
+              <a:buFontTx/>
+              <a:buChar char="-"/>
+            </a:pPr>
+            <a:r>
+              <a:rPr lang="en-AU" sz="1400" dirty="0">
+                <a:solidFill>
+                  <a:schemeClr val="bg1">
+                    <a:lumMod val="85000"/>
+                  </a:schemeClr>
+                </a:solidFill>
+              </a:rPr>
+              <a:t>Resource spawn</a:t>
+            </a:r>
+          </a:p>
+          <a:p>
+            <a:pPr marL="285750" indent="-285750">
+              <a:buFontTx/>
+              <a:buChar char="-"/>
+            </a:pPr>
+            <a:r>
+              <a:rPr lang="en-AU" sz="1400" dirty="0">
+                <a:solidFill>
+                  <a:schemeClr val="bg1">
+                    <a:lumMod val="85000"/>
+                  </a:schemeClr>
+                </a:solidFill>
+              </a:rPr>
+              <a:t>Protection Point and Game Mode </a:t>
+            </a:r>
+          </a:p>
+          <a:p>
+            <a:pPr marL="285750" indent="-285750">
+              <a:buFontTx/>
+              <a:buChar char="-"/>
+            </a:pPr>
+            <a:r>
+              <a:rPr lang="en-AU" sz="1400" dirty="0">
+                <a:solidFill>
+                  <a:schemeClr val="bg1">
+                    <a:lumMod val="85000"/>
+                  </a:schemeClr>
+                </a:solidFill>
+              </a:rPr>
+              <a:t>Level design/Aesthetics</a:t>
+            </a:r>
+          </a:p>
+        </p:txBody>
+      </p:sp>
+      <p:sp>
+        <p:nvSpPr>
+          <p:cNvPr id="10" name="TextBox 9">
+            <a:extLst>
+              <a:ext uri="{FF2B5EF4-FFF2-40B4-BE49-F238E27FC236}">
+                <a16:creationId xmlns:a16="http://schemas.microsoft.com/office/drawing/2014/main" id="{F5EAE52C-814F-4F8F-94A5-F639CA9EA642}"/>
+              </a:ext>
+            </a:extLst>
+          </p:cNvPr>
+          <p:cNvSpPr txBox="1"/>
+          <p:nvPr/>
+        </p:nvSpPr>
+        <p:spPr>
+          <a:xfrm>
+            <a:off x="3009831" y="2737830"/>
+            <a:ext cx="2379121" cy="2031325"/>
+          </a:xfrm>
+          <a:prstGeom prst="rect">
+            <a:avLst/>
+          </a:prstGeom>
+          <a:noFill/>
+        </p:spPr>
+        <p:txBody>
+          <a:bodyPr wrap="square" rtlCol="0">
+            <a:spAutoFit/>
+          </a:bodyPr>
+          <a:lstStyle/>
+          <a:p>
+            <a:r>
+              <a:rPr lang="en-AU" sz="1400" dirty="0">
+                <a:solidFill>
+                  <a:schemeClr val="bg1">
+                    <a:lumMod val="85000"/>
+                  </a:schemeClr>
+                </a:solidFill>
+              </a:rPr>
+              <a:t>Tuesday 5.11.19</a:t>
+            </a:r>
+          </a:p>
+          <a:p>
+            <a:r>
+              <a:rPr lang="en-AU" sz="1400" b="1" dirty="0">
+                <a:solidFill>
+                  <a:schemeClr val="bg1">
+                    <a:lumMod val="85000"/>
+                  </a:schemeClr>
+                </a:solidFill>
+              </a:rPr>
+              <a:t>5 Hours</a:t>
+            </a:r>
+            <a:endParaRPr lang="en-AU" sz="1400" dirty="0">
+              <a:solidFill>
+                <a:schemeClr val="bg1">
+                  <a:lumMod val="85000"/>
+                </a:schemeClr>
+              </a:solidFill>
+            </a:endParaRPr>
+          </a:p>
+          <a:p>
+            <a:pPr marL="285750" indent="-285750">
+              <a:buFontTx/>
+              <a:buChar char="-"/>
+            </a:pPr>
+            <a:r>
+              <a:rPr lang="en-AU" sz="1400" dirty="0">
+                <a:solidFill>
+                  <a:schemeClr val="bg1">
+                    <a:lumMod val="85000"/>
+                  </a:schemeClr>
+                </a:solidFill>
+              </a:rPr>
+              <a:t>Player Controls rework</a:t>
+            </a:r>
+          </a:p>
+          <a:p>
+            <a:pPr marL="285750" indent="-285750">
+              <a:buFontTx/>
+              <a:buChar char="-"/>
+            </a:pPr>
+            <a:r>
+              <a:rPr lang="en-AU" sz="1400" dirty="0">
+                <a:solidFill>
+                  <a:schemeClr val="bg1">
+                    <a:lumMod val="85000"/>
+                  </a:schemeClr>
+                </a:solidFill>
+              </a:rPr>
+              <a:t>Gameplay balancing and testing</a:t>
+            </a:r>
+          </a:p>
+          <a:p>
+            <a:pPr marL="285750" indent="-285750">
+              <a:buFontTx/>
+              <a:buChar char="-"/>
+            </a:pPr>
+            <a:r>
+              <a:rPr lang="en-AU" sz="1400" dirty="0">
+                <a:solidFill>
+                  <a:schemeClr val="bg1">
+                    <a:lumMod val="85000"/>
+                  </a:schemeClr>
+                </a:solidFill>
+              </a:rPr>
+              <a:t>General debugging</a:t>
+            </a:r>
+          </a:p>
+          <a:p>
+            <a:pPr marL="285750" indent="-285750">
+              <a:buFontTx/>
+              <a:buChar char="-"/>
+            </a:pPr>
+            <a:r>
+              <a:rPr lang="en-AU" sz="1400" dirty="0">
+                <a:solidFill>
+                  <a:schemeClr val="bg1">
+                    <a:lumMod val="85000"/>
+                  </a:schemeClr>
+                </a:solidFill>
+              </a:rPr>
+              <a:t>Player Traps</a:t>
+            </a:r>
+          </a:p>
+          <a:p>
+            <a:pPr marL="285750" indent="-285750">
+              <a:buFontTx/>
+              <a:buChar char="-"/>
+            </a:pPr>
+            <a:r>
+              <a:rPr lang="en-AU" sz="1400" dirty="0">
+                <a:solidFill>
+                  <a:schemeClr val="bg1">
+                    <a:lumMod val="85000"/>
+                  </a:schemeClr>
+                </a:solidFill>
+              </a:rPr>
+              <a:t>In game UI</a:t>
+            </a:r>
+          </a:p>
+          <a:p>
+            <a:pPr marL="285750" indent="-285750">
+              <a:buFontTx/>
+              <a:buChar char="-"/>
+            </a:pPr>
+            <a:r>
+              <a:rPr lang="en-AU" sz="1400" dirty="0">
+                <a:solidFill>
+                  <a:schemeClr val="bg1">
+                    <a:lumMod val="85000"/>
+                  </a:schemeClr>
+                </a:solidFill>
+              </a:rPr>
+              <a:t>Level Design / Aesthetics</a:t>
+            </a:r>
+          </a:p>
+        </p:txBody>
+      </p:sp>
+      <p:sp>
+        <p:nvSpPr>
+          <p:cNvPr id="11" name="TextBox 10">
+            <a:extLst>
+              <a:ext uri="{FF2B5EF4-FFF2-40B4-BE49-F238E27FC236}">
+                <a16:creationId xmlns:a16="http://schemas.microsoft.com/office/drawing/2014/main" id="{8AF98AAC-96A1-468E-81E8-48F4F12F965D}"/>
+              </a:ext>
+            </a:extLst>
+          </p:cNvPr>
+          <p:cNvSpPr txBox="1"/>
+          <p:nvPr/>
+        </p:nvSpPr>
+        <p:spPr>
+          <a:xfrm>
+            <a:off x="8273960" y="2717476"/>
             <a:ext cx="3292547" cy="1815882"/>
           </a:xfrm>
           <a:prstGeom prst="rect">
@@ -3981,7 +4314,7 @@
                   </a:schemeClr>
                 </a:solidFill>
               </a:rPr>
-              <a:t>Saturday 2.11.19</a:t>
+              <a:t>Thursday 7.11.19</a:t>
             </a:r>
           </a:p>
           <a:p>
@@ -3993,15 +4326,8 @@
                   </a:schemeClr>
                 </a:solidFill>
               </a:rPr>
-              <a:t>4 Hours</a:t>
-            </a:r>
-            <a:endParaRPr lang="en-AU" sz="1400" dirty="0">
-              <a:solidFill>
-                <a:schemeClr val="bg1">
-                  <a:lumMod val="85000"/>
-                </a:schemeClr>
-              </a:solidFill>
-            </a:endParaRPr>
+              <a:t>6 Hours</a:t>
+            </a:r>
           </a:p>
           <a:p>
             <a:pPr marL="285750" indent="-285750">
@@ -4016,7 +4342,7 @@
                   </a:schemeClr>
                 </a:solidFill>
               </a:rPr>
-              <a:t>Projectile</a:t>
+              <a:t>Balancing</a:t>
             </a:r>
           </a:p>
           <a:p>
@@ -4032,7 +4358,7 @@
                   </a:schemeClr>
                 </a:solidFill>
               </a:rPr>
-              <a:t>Turret functionality</a:t>
+              <a:t>Enemy Debugging</a:t>
             </a:r>
           </a:p>
           <a:p>
@@ -4048,7 +4374,7 @@
                   </a:schemeClr>
                 </a:solidFill>
               </a:rPr>
-              <a:t>Player build turret</a:t>
+              <a:t>Playtests + feedback</a:t>
             </a:r>
           </a:p>
           <a:p>
@@ -4064,7 +4390,7 @@
                   </a:schemeClr>
                 </a:solidFill>
               </a:rPr>
-              <a:t>New enemy type (large zombie)</a:t>
+              <a:t>Aesthetics/Game feel</a:t>
             </a:r>
           </a:p>
           <a:p>
@@ -4080,477 +4406,7 @@
                   </a:schemeClr>
                 </a:solidFill>
               </a:rPr>
-              <a:t>UI basic setup</a:t>
-            </a:r>
-          </a:p>
-          <a:p>
-            <a:pPr marL="285750" indent="-285750">
-              <a:buFontTx/>
-              <a:buChar char="-"/>
-            </a:pPr>
-            <a:r>
-              <a:rPr lang="en-AU" sz="1400" dirty="0">
-                <a:solidFill>
-                  <a:schemeClr val="bg1">
-                    <a:lumMod val="85000"/>
-                  </a:schemeClr>
-                </a:solidFill>
-              </a:rPr>
-              <a:t>Spawn enemy basic setup</a:t>
-            </a:r>
-          </a:p>
-        </p:txBody>
-      </p:sp>
-      <p:sp>
-        <p:nvSpPr>
-          <p:cNvPr id="9" name="TextBox 8">
-            <a:extLst>
-              <a:ext uri="{FF2B5EF4-FFF2-40B4-BE49-F238E27FC236}">
-                <a16:creationId xmlns:a16="http://schemas.microsoft.com/office/drawing/2014/main" id="{E3BFC49F-CE6D-4A5F-8037-1DA390FBF843}"/>
-              </a:ext>
-            </a:extLst>
-          </p:cNvPr>
-          <p:cNvSpPr txBox="1"/>
-          <p:nvPr/>
-        </p:nvSpPr>
-        <p:spPr>
-          <a:xfrm>
-            <a:off x="302630" y="3283572"/>
-            <a:ext cx="2478672" cy="2062103"/>
-          </a:xfrm>
-          <a:prstGeom prst="rect">
-            <a:avLst/>
-          </a:prstGeom>
-          <a:noFill/>
-        </p:spPr>
-        <p:txBody>
-          <a:bodyPr wrap="square" rtlCol="0">
-            <a:spAutoFit/>
-          </a:bodyPr>
-          <a:lstStyle/>
-          <a:p>
-            <a:r>
-              <a:rPr lang="en-AU" sz="1400" dirty="0">
-                <a:solidFill>
-                  <a:schemeClr val="bg1">
-                    <a:lumMod val="85000"/>
-                  </a:schemeClr>
-                </a:solidFill>
-              </a:rPr>
-              <a:t>Monday 4.11.19</a:t>
-            </a:r>
-          </a:p>
-          <a:p>
-            <a:r>
-              <a:rPr lang="en-AU" sz="1400" b="1" dirty="0">
-                <a:solidFill>
-                  <a:schemeClr val="bg1">
-                    <a:lumMod val="85000"/>
-                  </a:schemeClr>
-                </a:solidFill>
-              </a:rPr>
-              <a:t>4 ½ Hours</a:t>
-            </a:r>
-          </a:p>
-          <a:p>
-            <a:pPr marL="285750" indent="-285750">
-              <a:buFontTx/>
-              <a:buChar char="-"/>
-            </a:pPr>
-            <a:r>
-              <a:rPr lang="en-AU" sz="1400" dirty="0">
-                <a:solidFill>
-                  <a:schemeClr val="bg1">
-                    <a:lumMod val="85000"/>
-                  </a:schemeClr>
-                </a:solidFill>
-              </a:rPr>
-              <a:t>Enemy Refactoring</a:t>
-            </a:r>
-          </a:p>
-          <a:p>
-            <a:pPr marL="285750" indent="-285750">
-              <a:buFontTx/>
-              <a:buChar char="-"/>
-            </a:pPr>
-            <a:r>
-              <a:rPr lang="en-AU" sz="1400" dirty="0">
-                <a:solidFill>
-                  <a:schemeClr val="bg1">
-                    <a:lumMod val="85000"/>
-                  </a:schemeClr>
-                </a:solidFill>
-              </a:rPr>
-              <a:t>Turret Functionality</a:t>
-            </a:r>
-          </a:p>
-          <a:p>
-            <a:pPr marL="285750" indent="-285750">
-              <a:buFontTx/>
-              <a:buChar char="-"/>
-            </a:pPr>
-            <a:r>
-              <a:rPr lang="en-AU" sz="1400" dirty="0">
-                <a:solidFill>
-                  <a:schemeClr val="bg1">
-                    <a:lumMod val="85000"/>
-                  </a:schemeClr>
-                </a:solidFill>
-              </a:rPr>
-              <a:t>Resource spawn</a:t>
-            </a:r>
-          </a:p>
-          <a:p>
-            <a:pPr marL="285750" indent="-285750">
-              <a:buFontTx/>
-              <a:buChar char="-"/>
-            </a:pPr>
-            <a:r>
-              <a:rPr lang="en-AU" sz="1400" dirty="0">
-                <a:solidFill>
-                  <a:schemeClr val="bg1">
-                    <a:lumMod val="85000"/>
-                  </a:schemeClr>
-                </a:solidFill>
-              </a:rPr>
-              <a:t>Protection Point and Game Mode </a:t>
-            </a:r>
-          </a:p>
-          <a:p>
-            <a:pPr marL="285750" indent="-285750">
-              <a:buFontTx/>
-              <a:buChar char="-"/>
-            </a:pPr>
-            <a:r>
-              <a:rPr lang="en-AU" sz="1400" dirty="0">
-                <a:solidFill>
-                  <a:schemeClr val="bg1">
-                    <a:lumMod val="85000"/>
-                  </a:schemeClr>
-                </a:solidFill>
-              </a:rPr>
-              <a:t>Player movement update</a:t>
-            </a:r>
-          </a:p>
-          <a:p>
-            <a:pPr marL="285750" indent="-285750">
-              <a:buFontTx/>
-              <a:buChar char="-"/>
-            </a:pPr>
-            <a:r>
-              <a:rPr lang="en-AU" sz="1400" dirty="0">
-                <a:solidFill>
-                  <a:schemeClr val="bg1">
-                    <a:lumMod val="85000"/>
-                  </a:schemeClr>
-                </a:solidFill>
-              </a:rPr>
-              <a:t>Level design/Aesthetics</a:t>
-            </a:r>
-          </a:p>
-        </p:txBody>
-      </p:sp>
-      <p:sp>
-        <p:nvSpPr>
-          <p:cNvPr id="10" name="TextBox 9">
-            <a:extLst>
-              <a:ext uri="{FF2B5EF4-FFF2-40B4-BE49-F238E27FC236}">
-                <a16:creationId xmlns:a16="http://schemas.microsoft.com/office/drawing/2014/main" id="{F5EAE52C-814F-4F8F-94A5-F639CA9EA642}"/>
-              </a:ext>
-            </a:extLst>
-          </p:cNvPr>
-          <p:cNvSpPr txBox="1"/>
-          <p:nvPr/>
-        </p:nvSpPr>
-        <p:spPr>
-          <a:xfrm>
-            <a:off x="2869155" y="3303925"/>
-            <a:ext cx="2379121" cy="2677656"/>
-          </a:xfrm>
-          <a:prstGeom prst="rect">
-            <a:avLst/>
-          </a:prstGeom>
-          <a:noFill/>
-        </p:spPr>
-        <p:txBody>
-          <a:bodyPr wrap="square" rtlCol="0">
-            <a:spAutoFit/>
-          </a:bodyPr>
-          <a:lstStyle/>
-          <a:p>
-            <a:r>
-              <a:rPr lang="en-AU" sz="1400" dirty="0">
-                <a:solidFill>
-                  <a:schemeClr val="bg1">
-                    <a:lumMod val="85000"/>
-                  </a:schemeClr>
-                </a:solidFill>
-              </a:rPr>
-              <a:t>Tuesday 5.11.19</a:t>
-            </a:r>
-          </a:p>
-          <a:p>
-            <a:r>
-              <a:rPr lang="en-AU" sz="1400" b="1" dirty="0">
-                <a:solidFill>
-                  <a:schemeClr val="bg1">
-                    <a:lumMod val="85000"/>
-                  </a:schemeClr>
-                </a:solidFill>
-              </a:rPr>
-              <a:t>5 Hours</a:t>
-            </a:r>
-            <a:endParaRPr lang="en-AU" sz="1400" dirty="0">
-              <a:solidFill>
-                <a:schemeClr val="bg1">
-                  <a:lumMod val="85000"/>
-                </a:schemeClr>
-              </a:solidFill>
-            </a:endParaRPr>
-          </a:p>
-          <a:p>
-            <a:pPr marL="285750" indent="-285750">
-              <a:buFontTx/>
-              <a:buChar char="-"/>
-            </a:pPr>
-            <a:r>
-              <a:rPr lang="en-AU" sz="1400" dirty="0">
-                <a:solidFill>
-                  <a:schemeClr val="bg1">
-                    <a:lumMod val="85000"/>
-                  </a:schemeClr>
-                </a:solidFill>
-              </a:rPr>
-              <a:t>Player control update</a:t>
-            </a:r>
-          </a:p>
-          <a:p>
-            <a:pPr marL="285750" indent="-285750">
-              <a:buFontTx/>
-              <a:buChar char="-"/>
-            </a:pPr>
-            <a:r>
-              <a:rPr lang="en-AU" sz="1400" dirty="0">
-                <a:solidFill>
-                  <a:schemeClr val="bg1">
-                    <a:lumMod val="85000"/>
-                  </a:schemeClr>
-                </a:solidFill>
-              </a:rPr>
-              <a:t>Gameplay balancing and testing</a:t>
-            </a:r>
-          </a:p>
-          <a:p>
-            <a:pPr marL="285750" indent="-285750">
-              <a:buFontTx/>
-              <a:buChar char="-"/>
-            </a:pPr>
-            <a:r>
-              <a:rPr lang="en-AU" sz="1400" dirty="0">
-                <a:solidFill>
-                  <a:schemeClr val="bg1">
-                    <a:lumMod val="85000"/>
-                  </a:schemeClr>
-                </a:solidFill>
-              </a:rPr>
-              <a:t>Code refactor and Debugging</a:t>
-            </a:r>
-          </a:p>
-          <a:p>
-            <a:pPr marL="285750" indent="-285750">
-              <a:buFontTx/>
-              <a:buChar char="-"/>
-            </a:pPr>
-            <a:r>
-              <a:rPr lang="en-AU" sz="1400" dirty="0">
-                <a:solidFill>
-                  <a:schemeClr val="bg1">
-                    <a:lumMod val="85000"/>
-                  </a:schemeClr>
-                </a:solidFill>
-              </a:rPr>
-              <a:t>Player Traps</a:t>
-            </a:r>
-          </a:p>
-          <a:p>
-            <a:pPr marL="285750" indent="-285750">
-              <a:buFontTx/>
-              <a:buChar char="-"/>
-            </a:pPr>
-            <a:r>
-              <a:rPr lang="en-AU" sz="1400" dirty="0">
-                <a:solidFill>
-                  <a:schemeClr val="bg1">
-                    <a:lumMod val="85000"/>
-                  </a:schemeClr>
-                </a:solidFill>
-              </a:rPr>
-              <a:t>In game UI</a:t>
-            </a:r>
-          </a:p>
-          <a:p>
-            <a:pPr marL="285750" indent="-285750">
-              <a:buFontTx/>
-              <a:buChar char="-"/>
-            </a:pPr>
-            <a:r>
-              <a:rPr lang="en-AU" sz="1400" dirty="0">
-                <a:solidFill>
-                  <a:schemeClr val="bg1">
-                    <a:lumMod val="85000"/>
-                  </a:schemeClr>
-                </a:solidFill>
-              </a:rPr>
-              <a:t>Citizen Count functionality</a:t>
-            </a:r>
-          </a:p>
-          <a:p>
-            <a:pPr marL="285750" indent="-285750">
-              <a:buFontTx/>
-              <a:buChar char="-"/>
-            </a:pPr>
-            <a:r>
-              <a:rPr lang="en-AU" sz="1400" dirty="0">
-                <a:solidFill>
-                  <a:schemeClr val="bg1">
-                    <a:lumMod val="85000"/>
-                  </a:schemeClr>
-                </a:solidFill>
-              </a:rPr>
-              <a:t>Level Design / Aesthetics</a:t>
-            </a:r>
-          </a:p>
-        </p:txBody>
-      </p:sp>
-      <p:sp>
-        <p:nvSpPr>
-          <p:cNvPr id="11" name="TextBox 10">
-            <a:extLst>
-              <a:ext uri="{FF2B5EF4-FFF2-40B4-BE49-F238E27FC236}">
-                <a16:creationId xmlns:a16="http://schemas.microsoft.com/office/drawing/2014/main" id="{8AF98AAC-96A1-468E-81E8-48F4F12F965D}"/>
-              </a:ext>
-            </a:extLst>
-          </p:cNvPr>
-          <p:cNvSpPr txBox="1"/>
-          <p:nvPr/>
-        </p:nvSpPr>
-        <p:spPr>
-          <a:xfrm>
-            <a:off x="8133284" y="3283571"/>
-            <a:ext cx="3292547" cy="1815882"/>
-          </a:xfrm>
-          <a:prstGeom prst="rect">
-            <a:avLst/>
-          </a:prstGeom>
-          <a:noFill/>
-        </p:spPr>
-        <p:txBody>
-          <a:bodyPr wrap="square" rtlCol="0">
-            <a:spAutoFit/>
-          </a:bodyPr>
-          <a:lstStyle/>
-          <a:p>
-            <a:r>
-              <a:rPr lang="en-AU" sz="1400" dirty="0">
-                <a:solidFill>
-                  <a:schemeClr val="bg1">
-                    <a:lumMod val="85000"/>
-                  </a:schemeClr>
-                </a:solidFill>
-              </a:rPr>
-              <a:t>Thursday 7.11.19</a:t>
-            </a:r>
-          </a:p>
-          <a:p>
-            <a:r>
-              <a:rPr lang="en-AU" sz="1400" b="1" dirty="0">
-                <a:solidFill>
-                  <a:schemeClr val="bg1">
-                    <a:lumMod val="85000"/>
-                  </a:schemeClr>
-                </a:solidFill>
-              </a:rPr>
-              <a:t>5 Hours</a:t>
-            </a:r>
-          </a:p>
-          <a:p>
-            <a:pPr marL="285750" indent="-285750">
-              <a:buFontTx/>
-              <a:buChar char="-"/>
-            </a:pPr>
-            <a:r>
-              <a:rPr lang="en-AU" sz="1400" dirty="0">
-                <a:solidFill>
-                  <a:schemeClr val="bg1">
-                    <a:lumMod val="85000"/>
-                  </a:schemeClr>
-                </a:solidFill>
-              </a:rPr>
-              <a:t>Balancing</a:t>
-            </a:r>
-          </a:p>
-          <a:p>
-            <a:pPr marL="285750" indent="-285750">
-              <a:buFontTx/>
-              <a:buChar char="-"/>
-            </a:pPr>
-            <a:r>
-              <a:rPr lang="en-AU" sz="1400" dirty="0">
-                <a:solidFill>
-                  <a:schemeClr val="bg1">
-                    <a:lumMod val="85000"/>
-                  </a:schemeClr>
-                </a:solidFill>
-              </a:rPr>
-              <a:t>Enemy Behaviour Debugging</a:t>
-            </a:r>
-          </a:p>
-          <a:p>
-            <a:pPr marL="285750" indent="-285750">
-              <a:buFontTx/>
-              <a:buChar char="-"/>
-            </a:pPr>
-            <a:r>
-              <a:rPr lang="en-AU" sz="1400" dirty="0">
-                <a:solidFill>
-                  <a:schemeClr val="bg1">
-                    <a:lumMod val="85000"/>
-                  </a:schemeClr>
-                </a:solidFill>
-              </a:rPr>
-              <a:t>Playtests + feedback</a:t>
-            </a:r>
-          </a:p>
-          <a:p>
-            <a:pPr marL="285750" indent="-285750">
-              <a:buFontTx/>
-              <a:buChar char="-"/>
-            </a:pPr>
-            <a:r>
-              <a:rPr lang="en-AU" sz="1400" dirty="0">
-                <a:solidFill>
-                  <a:schemeClr val="bg1">
-                    <a:lumMod val="85000"/>
-                  </a:schemeClr>
-                </a:solidFill>
-              </a:rPr>
-              <a:t>Aesthetics/Game feel</a:t>
-            </a:r>
-          </a:p>
-          <a:p>
-            <a:pPr marL="285750" indent="-285750">
-              <a:buFontTx/>
-              <a:buChar char="-"/>
-            </a:pPr>
-            <a:r>
-              <a:rPr lang="en-AU" sz="1400" dirty="0">
-                <a:solidFill>
-                  <a:schemeClr val="bg1">
-                    <a:lumMod val="85000"/>
-                  </a:schemeClr>
-                </a:solidFill>
-              </a:rPr>
-              <a:t>Start UI Complete</a:t>
+              <a:t>UI Work</a:t>
             </a:r>
           </a:p>
           <a:p>
@@ -4582,8 +4438,8 @@
         </p:nvSpPr>
         <p:spPr>
           <a:xfrm>
-            <a:off x="5336129" y="3283572"/>
-            <a:ext cx="2379121" cy="3539430"/>
+            <a:off x="5618602" y="2717477"/>
+            <a:ext cx="2379121" cy="2246769"/>
           </a:xfrm>
           <a:prstGeom prst="rect">
             <a:avLst/>
@@ -4632,7 +4488,7 @@
                   </a:schemeClr>
                 </a:solidFill>
               </a:rPr>
-              <a:t>Pick Up Objects and Object Spawn refactor</a:t>
+              <a:t>Code Refactor</a:t>
             </a:r>
           </a:p>
           <a:p>
@@ -4648,7 +4504,7 @@
                   </a:schemeClr>
                 </a:solidFill>
               </a:rPr>
-              <a:t>Citizen Pods Added</a:t>
+              <a:t>Citizen Pods</a:t>
             </a:r>
           </a:p>
           <a:p>
@@ -4680,7 +4536,7 @@
                   </a:schemeClr>
                 </a:solidFill>
               </a:rPr>
-              <a:t>Code Refactoring</a:t>
+              <a:t>Game Balancing + Playtesting</a:t>
             </a:r>
           </a:p>
           <a:p>
@@ -4696,7 +4552,7 @@
                   </a:schemeClr>
                 </a:solidFill>
               </a:rPr>
-              <a:t>Game Balancing</a:t>
+              <a:t>New Enemy Type </a:t>
             </a:r>
           </a:p>
           <a:p>
@@ -4712,7 +4568,7 @@
                   </a:schemeClr>
                 </a:solidFill>
               </a:rPr>
-              <a:t>Increased Randomization for values</a:t>
+              <a:t>Aesthetics/Level Design</a:t>
             </a:r>
           </a:p>
           <a:p>
@@ -4728,11 +4584,64 @@
                   </a:schemeClr>
                 </a:solidFill>
               </a:rPr>
-              <a:t>New Enemy Type (Advanced Zombie)</a:t>
-            </a:r>
-          </a:p>
-          <a:p>
-            <a:pPr marL="171450" indent="-171450">
+              <a:t>UI Work</a:t>
+            </a:r>
+          </a:p>
+        </p:txBody>
+      </p:sp>
+      <p:sp>
+        <p:nvSpPr>
+          <p:cNvPr id="13" name="TextBox 12">
+            <a:extLst>
+              <a:ext uri="{FF2B5EF4-FFF2-40B4-BE49-F238E27FC236}">
+                <a16:creationId xmlns:a16="http://schemas.microsoft.com/office/drawing/2014/main" id="{E57E6E26-3F15-4A37-89E5-D17B7624065B}"/>
+              </a:ext>
+            </a:extLst>
+          </p:cNvPr>
+          <p:cNvSpPr txBox="1"/>
+          <p:nvPr/>
+        </p:nvSpPr>
+        <p:spPr>
+          <a:xfrm>
+            <a:off x="302628" y="4858585"/>
+            <a:ext cx="2379121" cy="1815882"/>
+          </a:xfrm>
+          <a:prstGeom prst="rect">
+            <a:avLst/>
+          </a:prstGeom>
+          <a:noFill/>
+        </p:spPr>
+        <p:txBody>
+          <a:bodyPr wrap="square" rtlCol="0">
+            <a:spAutoFit/>
+          </a:bodyPr>
+          <a:lstStyle/>
+          <a:p>
+            <a:r>
+              <a:rPr lang="en-AU" sz="1400" dirty="0">
+                <a:solidFill>
+                  <a:schemeClr val="bg1">
+                    <a:lumMod val="85000"/>
+                  </a:schemeClr>
+                </a:solidFill>
+              </a:rPr>
+              <a:t>Friday 8.11.19</a:t>
+            </a:r>
+          </a:p>
+          <a:p>
+            <a:r>
+              <a:rPr lang="en-AU" sz="1400" b="1" dirty="0">
+                <a:solidFill>
+                  <a:schemeClr val="bg1">
+                    <a:lumMod val="85000"/>
+                  </a:schemeClr>
+                </a:solidFill>
+              </a:rPr>
+              <a:t>5 Hours</a:t>
+            </a:r>
+          </a:p>
+          <a:p>
+            <a:pPr marL="285750" indent="-285750">
               <a:buFontTx/>
               <a:buChar char="-"/>
             </a:pPr>
@@ -4744,11 +4653,11 @@
                   </a:schemeClr>
                 </a:solidFill>
               </a:rPr>
-              <a:t>Aesthetics/Level Design</a:t>
-            </a:r>
-          </a:p>
-          <a:p>
-            <a:pPr marL="171450" indent="-171450">
+              <a:t>AI Path System </a:t>
+            </a:r>
+          </a:p>
+          <a:p>
+            <a:pPr marL="285750" indent="-285750">
               <a:buFontTx/>
               <a:buChar char="-"/>
             </a:pPr>
@@ -4760,11 +4669,109 @@
                   </a:schemeClr>
                 </a:solidFill>
               </a:rPr>
-              <a:t>Start UI Setup</a:t>
-            </a:r>
-            <a:br>
-              <a:rPr lang="en-AU" sz="1400" dirty="0"/>
-            </a:br>
+              <a:t>Playtests + feedback</a:t>
+            </a:r>
+          </a:p>
+          <a:p>
+            <a:pPr marL="285750" indent="-285750">
+              <a:buFontTx/>
+              <a:buChar char="-"/>
+            </a:pPr>
+            <a:r>
+              <a:rPr lang="en-AU" sz="1400" dirty="0">
+                <a:solidFill>
+                  <a:schemeClr val="bg1">
+                    <a:lumMod val="85000"/>
+                  </a:schemeClr>
+                </a:solidFill>
+              </a:rPr>
+              <a:t>Aesthetics/Game feel</a:t>
+            </a:r>
+          </a:p>
+          <a:p>
+            <a:pPr marL="285750" indent="-285750">
+              <a:buFontTx/>
+              <a:buChar char="-"/>
+            </a:pPr>
+            <a:r>
+              <a:rPr lang="en-AU" sz="1400" dirty="0">
+                <a:solidFill>
+                  <a:schemeClr val="bg1">
+                    <a:lumMod val="85000"/>
+                  </a:schemeClr>
+                </a:solidFill>
+              </a:rPr>
+              <a:t>Random Map Selection System</a:t>
+            </a:r>
+          </a:p>
+          <a:p>
+            <a:pPr marL="285750" indent="-285750">
+              <a:buFontTx/>
+              <a:buChar char="-"/>
+            </a:pPr>
+            <a:r>
+              <a:rPr lang="en-AU" sz="1400" dirty="0">
+                <a:solidFill>
+                  <a:schemeClr val="bg1">
+                    <a:lumMod val="85000"/>
+                  </a:schemeClr>
+                </a:solidFill>
+              </a:rPr>
+              <a:t>Code Refactoring</a:t>
+            </a:r>
+          </a:p>
+        </p:txBody>
+      </p:sp>
+      <p:sp>
+        <p:nvSpPr>
+          <p:cNvPr id="14" name="TextBox 13">
+            <a:extLst>
+              <a:ext uri="{FF2B5EF4-FFF2-40B4-BE49-F238E27FC236}">
+                <a16:creationId xmlns:a16="http://schemas.microsoft.com/office/drawing/2014/main" id="{35985DC6-9968-4BAD-B381-D80792A98B9A}"/>
+              </a:ext>
+            </a:extLst>
+          </p:cNvPr>
+          <p:cNvSpPr txBox="1"/>
+          <p:nvPr/>
+        </p:nvSpPr>
+        <p:spPr>
+          <a:xfrm>
+            <a:off x="3009831" y="4864090"/>
+            <a:ext cx="2379121" cy="1600438"/>
+          </a:xfrm>
+          <a:prstGeom prst="rect">
+            <a:avLst/>
+          </a:prstGeom>
+          <a:noFill/>
+        </p:spPr>
+        <p:txBody>
+          <a:bodyPr wrap="square" rtlCol="0">
+            <a:spAutoFit/>
+          </a:bodyPr>
+          <a:lstStyle/>
+          <a:p>
+            <a:r>
+              <a:rPr lang="en-AU" sz="1400" dirty="0">
+                <a:solidFill>
+                  <a:schemeClr val="bg1">
+                    <a:lumMod val="85000"/>
+                  </a:schemeClr>
+                </a:solidFill>
+              </a:rPr>
+              <a:t>Saturday 9.11.19</a:t>
+            </a:r>
+          </a:p>
+          <a:p>
+            <a:r>
+              <a:rPr lang="en-AU" sz="1400" b="1" dirty="0">
+                <a:solidFill>
+                  <a:schemeClr val="bg1">
+                    <a:lumMod val="85000"/>
+                  </a:schemeClr>
+                </a:solidFill>
+              </a:rPr>
+              <a:t>4 Hours</a:t>
+            </a:r>
             <a:endParaRPr lang="en-AU" sz="1400" dirty="0">
               <a:solidFill>
                 <a:schemeClr val="bg1">
@@ -4778,53 +4785,15 @@
               <a:buFontTx/>
               <a:buChar char="-"/>
             </a:pPr>
-            <a:endParaRPr lang="en-AU" sz="1400" dirty="0">
-              <a:solidFill>
-                <a:schemeClr val="bg1">
-                  <a:lumMod val="85000"/>
-                </a:schemeClr>
-              </a:solidFill>
-            </a:endParaRPr>
-          </a:p>
-        </p:txBody>
-      </p:sp>
-      <p:sp>
-        <p:nvSpPr>
-          <p:cNvPr id="13" name="TextBox 12">
-            <a:extLst>
-              <a:ext uri="{FF2B5EF4-FFF2-40B4-BE49-F238E27FC236}">
-                <a16:creationId xmlns:a16="http://schemas.microsoft.com/office/drawing/2014/main" id="{E57E6E26-3F15-4A37-89E5-D17B7624065B}"/>
-              </a:ext>
-            </a:extLst>
-          </p:cNvPr>
-          <p:cNvSpPr txBox="1"/>
-          <p:nvPr/>
-        </p:nvSpPr>
-        <p:spPr>
-          <a:xfrm>
-            <a:off x="8133283" y="4884009"/>
-            <a:ext cx="2379121" cy="1384995"/>
-          </a:xfrm>
-          <a:prstGeom prst="rect">
-            <a:avLst/>
-          </a:prstGeom>
-          <a:noFill/>
-        </p:spPr>
-        <p:txBody>
-          <a:bodyPr wrap="square" rtlCol="0">
-            <a:spAutoFit/>
-          </a:bodyPr>
-          <a:lstStyle/>
-          <a:p>
-            <a:r>
-              <a:rPr lang="en-AU" sz="1400" dirty="0">
-                <a:solidFill>
-                  <a:schemeClr val="bg1">
-                    <a:lumMod val="85000"/>
-                  </a:schemeClr>
-                </a:solidFill>
-              </a:rPr>
-              <a:t>Friday 8.11.19</a:t>
+            <a:r>
+              <a:rPr lang="en-AU" sz="1400" dirty="0">
+                <a:solidFill>
+                  <a:schemeClr val="bg1">
+                    <a:lumMod val="85000"/>
+                  </a:schemeClr>
+                </a:solidFill>
+              </a:rPr>
+              <a:t>Main Menu</a:t>
             </a:r>
           </a:p>
           <a:p>
@@ -4840,7 +4809,7 @@
                   </a:schemeClr>
                 </a:solidFill>
               </a:rPr>
-              <a:t>AI Path System Rework</a:t>
+              <a:t>UI Complete</a:t>
             </a:r>
           </a:p>
           <a:p>
@@ -4856,7 +4825,7 @@
                   </a:schemeClr>
                 </a:solidFill>
               </a:rPr>
-              <a:t>Playtests + feedback</a:t>
+              <a:t>Level Design</a:t>
             </a:r>
           </a:p>
           <a:p>
@@ -4872,7 +4841,7 @@
                   </a:schemeClr>
                 </a:solidFill>
               </a:rPr>
-              <a:t>Aesthetics/Game feel</a:t>
+              <a:t>Clean up files</a:t>
             </a:r>
           </a:p>
           <a:p>
@@ -4888,21 +4857,8 @@
                   </a:schemeClr>
                 </a:solidFill>
               </a:rPr>
-              <a:t>Level Generation Setup</a:t>
-            </a:r>
-          </a:p>
-          <a:p>
-            <a:pPr marL="285750" indent="-285750">
-              <a:buFontTx/>
-              <a:buChar char="-"/>
-            </a:pPr>
-            <a:endParaRPr lang="en-AU" sz="1400" dirty="0">
-              <a:solidFill>
-                <a:schemeClr val="bg1">
-                  <a:lumMod val="85000"/>
-                </a:schemeClr>
-              </a:solidFill>
-            </a:endParaRPr>
+              <a:t>Code Refactoring</a:t>
+            </a:r>
           </a:p>
         </p:txBody>
       </p:sp>

</xml_diff>

<commit_message>
Project clean up + enemy updated targeting system
</commit_message>
<xml_diff>
--- a/AliensVsZombieDocument.pptx
+++ b/AliensVsZombieDocument.pptx
@@ -3413,7 +3413,7 @@
         </p:nvSpPr>
         <p:spPr>
           <a:xfrm>
-            <a:off x="2751189" y="1950085"/>
+            <a:off x="2620561" y="1608441"/>
             <a:ext cx="1792735" cy="523220"/>
           </a:xfrm>
           <a:prstGeom prst="rect">
@@ -3454,7 +3454,7 @@
         </p:nvSpPr>
         <p:spPr>
           <a:xfrm>
-            <a:off x="7627871" y="1950085"/>
+            <a:off x="7497243" y="1608441"/>
             <a:ext cx="1769715" cy="523220"/>
           </a:xfrm>
           <a:prstGeom prst="rect">
@@ -4737,7 +4737,7 @@
         <p:spPr>
           <a:xfrm>
             <a:off x="3009831" y="4864090"/>
-            <a:ext cx="2379121" cy="1600438"/>
+            <a:ext cx="1732991" cy="1600438"/>
           </a:xfrm>
           <a:prstGeom prst="rect">
             <a:avLst/>
@@ -4858,6 +4858,114 @@
                 </a:solidFill>
               </a:rPr>
               <a:t>Code Refactoring</a:t>
+            </a:r>
+          </a:p>
+        </p:txBody>
+      </p:sp>
+      <p:sp>
+        <p:nvSpPr>
+          <p:cNvPr id="15" name="TextBox 14">
+            <a:extLst>
+              <a:ext uri="{FF2B5EF4-FFF2-40B4-BE49-F238E27FC236}">
+                <a16:creationId xmlns:a16="http://schemas.microsoft.com/office/drawing/2014/main" id="{DA433451-4DDF-48BC-8247-BFAABC1246F3}"/>
+              </a:ext>
+            </a:extLst>
+          </p:cNvPr>
+          <p:cNvSpPr txBox="1"/>
+          <p:nvPr/>
+        </p:nvSpPr>
+        <p:spPr>
+          <a:xfrm>
+            <a:off x="5618602" y="4964246"/>
+            <a:ext cx="2143320" cy="1169551"/>
+          </a:xfrm>
+          <a:prstGeom prst="rect">
+            <a:avLst/>
+          </a:prstGeom>
+          <a:noFill/>
+        </p:spPr>
+        <p:txBody>
+          <a:bodyPr wrap="square" rtlCol="0">
+            <a:spAutoFit/>
+          </a:bodyPr>
+          <a:lstStyle/>
+          <a:p>
+            <a:r>
+              <a:rPr lang="en-AU" sz="1400" dirty="0">
+                <a:solidFill>
+                  <a:schemeClr val="bg1">
+                    <a:lumMod val="85000"/>
+                  </a:schemeClr>
+                </a:solidFill>
+              </a:rPr>
+              <a:t>Sunday 10.11.19</a:t>
+            </a:r>
+          </a:p>
+          <a:p>
+            <a:r>
+              <a:rPr lang="en-AU" sz="1400" b="1" dirty="0">
+                <a:solidFill>
+                  <a:schemeClr val="bg1">
+                    <a:lumMod val="85000"/>
+                  </a:schemeClr>
+                </a:solidFill>
+              </a:rPr>
+              <a:t>4 Hours</a:t>
+            </a:r>
+            <a:endParaRPr lang="en-AU" sz="1400" dirty="0">
+              <a:solidFill>
+                <a:schemeClr val="bg1">
+                  <a:lumMod val="85000"/>
+                </a:schemeClr>
+              </a:solidFill>
+            </a:endParaRPr>
+          </a:p>
+          <a:p>
+            <a:pPr marL="285750" indent="-285750">
+              <a:buFontTx/>
+              <a:buChar char="-"/>
+            </a:pPr>
+            <a:r>
+              <a:rPr lang="en-AU" sz="1400" dirty="0">
+                <a:solidFill>
+                  <a:schemeClr val="bg1">
+                    <a:lumMod val="85000"/>
+                  </a:schemeClr>
+                </a:solidFill>
+              </a:rPr>
+              <a:t>Creating SFX Assets</a:t>
+            </a:r>
+          </a:p>
+          <a:p>
+            <a:pPr marL="285750" indent="-285750">
+              <a:buFontTx/>
+              <a:buChar char="-"/>
+            </a:pPr>
+            <a:r>
+              <a:rPr lang="en-AU" sz="1400" dirty="0">
+                <a:solidFill>
+                  <a:schemeClr val="bg1">
+                    <a:lumMod val="85000"/>
+                  </a:schemeClr>
+                </a:solidFill>
+              </a:rPr>
+              <a:t>Composing Music</a:t>
+            </a:r>
+          </a:p>
+          <a:p>
+            <a:pPr marL="285750" indent="-285750">
+              <a:buFontTx/>
+              <a:buChar char="-"/>
+            </a:pPr>
+            <a:r>
+              <a:rPr lang="en-AU" sz="1400" dirty="0">
+                <a:solidFill>
+                  <a:schemeClr val="bg1">
+                    <a:lumMod val="85000"/>
+                  </a:schemeClr>
+                </a:solidFill>
+              </a:rPr>
+              <a:t>Audio implementation</a:t>
             </a:r>
           </a:p>
         </p:txBody>

</xml_diff>

<commit_message>
VFX added + Pop Up UI WIP
</commit_message>
<xml_diff>
--- a/AliensVsZombieDocument.pptx
+++ b/AliensVsZombieDocument.pptx
@@ -3413,7 +3413,7 @@
         </p:nvSpPr>
         <p:spPr>
           <a:xfrm>
-            <a:off x="2620561" y="1608441"/>
+            <a:off x="1585581" y="1603674"/>
             <a:ext cx="1792735" cy="523220"/>
           </a:xfrm>
           <a:prstGeom prst="rect">
@@ -3454,7 +3454,7 @@
         </p:nvSpPr>
         <p:spPr>
           <a:xfrm>
-            <a:off x="7497243" y="1608441"/>
+            <a:off x="6904391" y="1608441"/>
             <a:ext cx="1769715" cy="523220"/>
           </a:xfrm>
           <a:prstGeom prst="rect">
@@ -3477,6 +3477,355 @@
                 </a:solidFill>
               </a:rPr>
               <a:t>OBJECTIVE</a:t>
+            </a:r>
+          </a:p>
+        </p:txBody>
+      </p:sp>
+      <p:sp>
+        <p:nvSpPr>
+          <p:cNvPr id="7" name="TextBox 6">
+            <a:extLst>
+              <a:ext uri="{FF2B5EF4-FFF2-40B4-BE49-F238E27FC236}">
+                <a16:creationId xmlns:a16="http://schemas.microsoft.com/office/drawing/2014/main" id="{A08BF799-0EA5-4C3A-8F0C-4A2D70FE7C4B}"/>
+              </a:ext>
+            </a:extLst>
+          </p:cNvPr>
+          <p:cNvSpPr txBox="1"/>
+          <p:nvPr/>
+        </p:nvSpPr>
+        <p:spPr>
+          <a:xfrm>
+            <a:off x="532179" y="2549893"/>
+            <a:ext cx="3707810" cy="523220"/>
+          </a:xfrm>
+          <a:prstGeom prst="rect">
+            <a:avLst/>
+          </a:prstGeom>
+          <a:noFill/>
+        </p:spPr>
+        <p:txBody>
+          <a:bodyPr wrap="none" rtlCol="0">
+            <a:spAutoFit/>
+          </a:bodyPr>
+          <a:lstStyle/>
+          <a:p>
+            <a:r>
+              <a:rPr lang="en-AU" sz="2800" b="1" dirty="0">
+                <a:solidFill>
+                  <a:schemeClr val="bg1">
+                    <a:lumMod val="85000"/>
+                  </a:schemeClr>
+                </a:solidFill>
+              </a:rPr>
+              <a:t>L Joy Stick: MOVEMENT</a:t>
+            </a:r>
+          </a:p>
+        </p:txBody>
+      </p:sp>
+      <p:sp>
+        <p:nvSpPr>
+          <p:cNvPr id="8" name="TextBox 7">
+            <a:extLst>
+              <a:ext uri="{FF2B5EF4-FFF2-40B4-BE49-F238E27FC236}">
+                <a16:creationId xmlns:a16="http://schemas.microsoft.com/office/drawing/2014/main" id="{63442DF2-10E8-40E8-A3DA-47DA9C50BBD1}"/>
+              </a:ext>
+            </a:extLst>
+          </p:cNvPr>
+          <p:cNvSpPr txBox="1"/>
+          <p:nvPr/>
+        </p:nvSpPr>
+        <p:spPr>
+          <a:xfrm>
+            <a:off x="532179" y="3073113"/>
+            <a:ext cx="3339760" cy="523220"/>
+          </a:xfrm>
+          <a:prstGeom prst="rect">
+            <a:avLst/>
+          </a:prstGeom>
+          <a:noFill/>
+        </p:spPr>
+        <p:txBody>
+          <a:bodyPr wrap="none" rtlCol="0">
+            <a:spAutoFit/>
+          </a:bodyPr>
+          <a:lstStyle/>
+          <a:p>
+            <a:r>
+              <a:rPr lang="en-AU" sz="2800" b="1" dirty="0">
+                <a:solidFill>
+                  <a:schemeClr val="bg1">
+                    <a:lumMod val="85000"/>
+                  </a:schemeClr>
+                </a:solidFill>
+              </a:rPr>
+              <a:t>L Trigger: PULL BEAM</a:t>
+            </a:r>
+          </a:p>
+        </p:txBody>
+      </p:sp>
+      <p:sp>
+        <p:nvSpPr>
+          <p:cNvPr id="9" name="TextBox 8">
+            <a:extLst>
+              <a:ext uri="{FF2B5EF4-FFF2-40B4-BE49-F238E27FC236}">
+                <a16:creationId xmlns:a16="http://schemas.microsoft.com/office/drawing/2014/main" id="{BB5CEDED-06F7-4D78-B643-EA7AFB54BDC3}"/>
+              </a:ext>
+            </a:extLst>
+          </p:cNvPr>
+          <p:cNvSpPr txBox="1"/>
+          <p:nvPr/>
+        </p:nvSpPr>
+        <p:spPr>
+          <a:xfrm>
+            <a:off x="532178" y="3594130"/>
+            <a:ext cx="3577005" cy="523220"/>
+          </a:xfrm>
+          <a:prstGeom prst="rect">
+            <a:avLst/>
+          </a:prstGeom>
+          <a:noFill/>
+        </p:spPr>
+        <p:txBody>
+          <a:bodyPr wrap="none" rtlCol="0">
+            <a:spAutoFit/>
+          </a:bodyPr>
+          <a:lstStyle/>
+          <a:p>
+            <a:r>
+              <a:rPr lang="en-AU" sz="2800" b="1" dirty="0">
+                <a:solidFill>
+                  <a:schemeClr val="bg1">
+                    <a:lumMod val="85000"/>
+                  </a:schemeClr>
+                </a:solidFill>
+              </a:rPr>
+              <a:t>R Trigger: LASER BEAM</a:t>
+            </a:r>
+          </a:p>
+        </p:txBody>
+      </p:sp>
+      <p:sp>
+        <p:nvSpPr>
+          <p:cNvPr id="10" name="TextBox 9">
+            <a:extLst>
+              <a:ext uri="{FF2B5EF4-FFF2-40B4-BE49-F238E27FC236}">
+                <a16:creationId xmlns:a16="http://schemas.microsoft.com/office/drawing/2014/main" id="{FFB48FA4-D136-4238-BEE3-A4001C084371}"/>
+              </a:ext>
+            </a:extLst>
+          </p:cNvPr>
+          <p:cNvSpPr txBox="1"/>
+          <p:nvPr/>
+        </p:nvSpPr>
+        <p:spPr>
+          <a:xfrm>
+            <a:off x="532177" y="4115147"/>
+            <a:ext cx="4040209" cy="523220"/>
+          </a:xfrm>
+          <a:prstGeom prst="rect">
+            <a:avLst/>
+          </a:prstGeom>
+          <a:noFill/>
+        </p:spPr>
+        <p:txBody>
+          <a:bodyPr wrap="none" rtlCol="0">
+            <a:spAutoFit/>
+          </a:bodyPr>
+          <a:lstStyle/>
+          <a:p>
+            <a:r>
+              <a:rPr lang="en-AU" sz="2800" b="1" dirty="0">
+                <a:solidFill>
+                  <a:schemeClr val="bg1">
+                    <a:lumMod val="85000"/>
+                  </a:schemeClr>
+                </a:solidFill>
+              </a:rPr>
+              <a:t>A Button: SPAWN TURRET</a:t>
+            </a:r>
+          </a:p>
+        </p:txBody>
+      </p:sp>
+      <p:sp>
+        <p:nvSpPr>
+          <p:cNvPr id="11" name="TextBox 10">
+            <a:extLst>
+              <a:ext uri="{FF2B5EF4-FFF2-40B4-BE49-F238E27FC236}">
+                <a16:creationId xmlns:a16="http://schemas.microsoft.com/office/drawing/2014/main" id="{74590E7D-6B03-40BE-A899-100684C6DAF6}"/>
+              </a:ext>
+            </a:extLst>
+          </p:cNvPr>
+          <p:cNvSpPr txBox="1"/>
+          <p:nvPr/>
+        </p:nvSpPr>
+        <p:spPr>
+          <a:xfrm>
+            <a:off x="532176" y="4636164"/>
+            <a:ext cx="3639458" cy="523220"/>
+          </a:xfrm>
+          <a:prstGeom prst="rect">
+            <a:avLst/>
+          </a:prstGeom>
+          <a:noFill/>
+        </p:spPr>
+        <p:txBody>
+          <a:bodyPr wrap="none" rtlCol="0">
+            <a:spAutoFit/>
+          </a:bodyPr>
+          <a:lstStyle/>
+          <a:p>
+            <a:r>
+              <a:rPr lang="en-AU" sz="2800" b="1" dirty="0">
+                <a:solidFill>
+                  <a:schemeClr val="bg1">
+                    <a:lumMod val="85000"/>
+                  </a:schemeClr>
+                </a:solidFill>
+              </a:rPr>
+              <a:t>X Button: SPAWN TRAP</a:t>
+            </a:r>
+          </a:p>
+        </p:txBody>
+      </p:sp>
+      <p:sp>
+        <p:nvSpPr>
+          <p:cNvPr id="12" name="TextBox 11">
+            <a:extLst>
+              <a:ext uri="{FF2B5EF4-FFF2-40B4-BE49-F238E27FC236}">
+                <a16:creationId xmlns:a16="http://schemas.microsoft.com/office/drawing/2014/main" id="{DE5FC2E7-DA9B-49DF-A3C6-CB9CC810C069}"/>
+              </a:ext>
+            </a:extLst>
+          </p:cNvPr>
+          <p:cNvSpPr txBox="1"/>
+          <p:nvPr/>
+        </p:nvSpPr>
+        <p:spPr>
+          <a:xfrm>
+            <a:off x="4903002" y="2378438"/>
+            <a:ext cx="6834121" cy="3416320"/>
+          </a:xfrm>
+          <a:prstGeom prst="rect">
+            <a:avLst/>
+          </a:prstGeom>
+          <a:noFill/>
+        </p:spPr>
+        <p:txBody>
+          <a:bodyPr wrap="square" rtlCol="0">
+            <a:spAutoFit/>
+          </a:bodyPr>
+          <a:lstStyle/>
+          <a:p>
+            <a:r>
+              <a:rPr lang="en-AU" dirty="0">
+                <a:solidFill>
+                  <a:schemeClr val="bg1">
+                    <a:lumMod val="85000"/>
+                  </a:schemeClr>
+                </a:solidFill>
+              </a:rPr>
+              <a:t>The goal of the game is to protect your central hub for as long as possible. The longer you keep it alive, the more citizens that will escape from the zombie horde (represented as a Citizens Saved score at the centre top).</a:t>
+            </a:r>
+          </a:p>
+          <a:p>
+            <a:endParaRPr lang="en-AU" dirty="0">
+              <a:solidFill>
+                <a:schemeClr val="bg1">
+                  <a:lumMod val="85000"/>
+                </a:schemeClr>
+              </a:solidFill>
+            </a:endParaRPr>
+          </a:p>
+          <a:p>
+            <a:r>
+              <a:rPr lang="en-AU" dirty="0">
+                <a:solidFill>
+                  <a:schemeClr val="bg1">
+                    <a:lumMod val="85000"/>
+                  </a:schemeClr>
+                </a:solidFill>
+              </a:rPr>
+              <a:t>Resources are gained through beaming up the </a:t>
+            </a:r>
+            <a:r>
+              <a:rPr lang="en-AU" b="1" dirty="0">
+                <a:solidFill>
+                  <a:schemeClr val="bg1">
+                    <a:lumMod val="85000"/>
+                  </a:schemeClr>
+                </a:solidFill>
+              </a:rPr>
+              <a:t>blue cubes</a:t>
+            </a:r>
+            <a:r>
+              <a:rPr lang="en-AU" dirty="0">
+                <a:solidFill>
+                  <a:schemeClr val="bg1">
+                    <a:lumMod val="85000"/>
+                  </a:schemeClr>
+                </a:solidFill>
+              </a:rPr>
+              <a:t>. Additional citizens can be saved by picking up </a:t>
+            </a:r>
+            <a:r>
+              <a:rPr lang="en-AU" b="1" dirty="0">
+                <a:solidFill>
+                  <a:schemeClr val="bg1">
+                    <a:lumMod val="85000"/>
+                  </a:schemeClr>
+                </a:solidFill>
+              </a:rPr>
+              <a:t>citizen pods </a:t>
+            </a:r>
+            <a:r>
+              <a:rPr lang="en-AU" dirty="0">
+                <a:solidFill>
+                  <a:schemeClr val="bg1">
+                    <a:lumMod val="85000"/>
+                  </a:schemeClr>
+                </a:solidFill>
+              </a:rPr>
+              <a:t>that drop from the sky.</a:t>
+            </a:r>
+          </a:p>
+          <a:p>
+            <a:endParaRPr lang="en-AU" dirty="0">
+              <a:solidFill>
+                <a:schemeClr val="bg1">
+                  <a:lumMod val="85000"/>
+                </a:schemeClr>
+              </a:solidFill>
+            </a:endParaRPr>
+          </a:p>
+          <a:p>
+            <a:r>
+              <a:rPr lang="en-AU" dirty="0">
+                <a:solidFill>
+                  <a:schemeClr val="bg1">
+                    <a:lumMod val="85000"/>
+                  </a:schemeClr>
+                </a:solidFill>
+              </a:rPr>
+              <a:t>Use your resources to spawn turrets or traps, and your laser beam to dish out additional damage by burning through the undead horde.</a:t>
+            </a:r>
+          </a:p>
+          <a:p>
+            <a:endParaRPr lang="en-AU" dirty="0">
+              <a:solidFill>
+                <a:schemeClr val="bg1">
+                  <a:lumMod val="85000"/>
+                </a:schemeClr>
+              </a:solidFill>
+            </a:endParaRPr>
+          </a:p>
+          <a:p>
+            <a:r>
+              <a:rPr lang="en-AU" dirty="0">
+                <a:solidFill>
+                  <a:schemeClr val="bg1">
+                    <a:lumMod val="85000"/>
+                  </a:schemeClr>
+                </a:solidFill>
+              </a:rPr>
+              <a:t>Good luck!</a:t>
             </a:r>
           </a:p>
         </p:txBody>
@@ -3535,7 +3884,7 @@
         </p:nvSpPr>
         <p:spPr>
           <a:xfrm>
-            <a:off x="4189612" y="273685"/>
+            <a:off x="4189612" y="203241"/>
             <a:ext cx="3377015" cy="707886"/>
           </a:xfrm>
           <a:prstGeom prst="rect">
@@ -3576,7 +3925,7 @@
         </p:nvSpPr>
         <p:spPr>
           <a:xfrm>
-            <a:off x="302628" y="1261996"/>
+            <a:off x="302628" y="1121066"/>
             <a:ext cx="1965282" cy="1169551"/>
           </a:xfrm>
           <a:prstGeom prst="rect">
@@ -3591,14 +3940,24 @@
           <a:lstStyle/>
           <a:p>
             <a:r>
-              <a:rPr lang="en-AU" sz="1400" dirty="0">
-                <a:solidFill>
-                  <a:schemeClr val="bg1">
-                    <a:lumMod val="85000"/>
-                  </a:schemeClr>
-                </a:solidFill>
-              </a:rPr>
-              <a:t>Wednesday 30.10.19</a:t>
+              <a:rPr lang="en-AU" sz="1400" b="1" dirty="0">
+                <a:solidFill>
+                  <a:schemeClr val="bg1">
+                    <a:lumMod val="85000"/>
+                  </a:schemeClr>
+                </a:solidFill>
+              </a:rPr>
+              <a:t>Wednesday</a:t>
+            </a:r>
+            <a:r>
+              <a:rPr lang="en-AU" sz="1400" dirty="0">
+                <a:solidFill>
+                  <a:schemeClr val="bg1">
+                    <a:lumMod val="85000"/>
+                  </a:schemeClr>
+                </a:solidFill>
+              </a:rPr>
+              <a:t> 30.10.19</a:t>
             </a:r>
           </a:p>
           <a:p>
@@ -3677,7 +4036,7 @@
         </p:nvSpPr>
         <p:spPr>
           <a:xfrm>
-            <a:off x="3009833" y="1267501"/>
+            <a:off x="3009833" y="1126571"/>
             <a:ext cx="2541045" cy="1169551"/>
           </a:xfrm>
           <a:prstGeom prst="rect">
@@ -3692,14 +4051,24 @@
           <a:lstStyle/>
           <a:p>
             <a:r>
-              <a:rPr lang="en-AU" sz="1400" dirty="0">
-                <a:solidFill>
-                  <a:schemeClr val="bg1">
-                    <a:lumMod val="85000"/>
-                  </a:schemeClr>
-                </a:solidFill>
-              </a:rPr>
-              <a:t>Thursday 31.10.19</a:t>
+              <a:rPr lang="en-AU" sz="1400" b="1" dirty="0">
+                <a:solidFill>
+                  <a:schemeClr val="bg1">
+                    <a:lumMod val="85000"/>
+                  </a:schemeClr>
+                </a:solidFill>
+              </a:rPr>
+              <a:t>Thursday</a:t>
+            </a:r>
+            <a:r>
+              <a:rPr lang="en-AU" sz="1400" dirty="0">
+                <a:solidFill>
+                  <a:schemeClr val="bg1">
+                    <a:lumMod val="85000"/>
+                  </a:schemeClr>
+                </a:solidFill>
+              </a:rPr>
+              <a:t> 31.10.19</a:t>
             </a:r>
           </a:p>
           <a:p>
@@ -3778,7 +4147,7 @@
         </p:nvSpPr>
         <p:spPr>
           <a:xfrm>
-            <a:off x="5530751" y="1257900"/>
+            <a:off x="5530751" y="1116970"/>
             <a:ext cx="3007807" cy="1384995"/>
           </a:xfrm>
           <a:prstGeom prst="rect">
@@ -3793,14 +4162,24 @@
           <a:lstStyle/>
           <a:p>
             <a:r>
-              <a:rPr lang="en-AU" sz="1400" dirty="0">
-                <a:solidFill>
-                  <a:schemeClr val="bg1">
-                    <a:lumMod val="85000"/>
-                  </a:schemeClr>
-                </a:solidFill>
-              </a:rPr>
-              <a:t>Friday 1.11.19</a:t>
+              <a:rPr lang="en-AU" sz="1400" b="1" dirty="0">
+                <a:solidFill>
+                  <a:schemeClr val="bg1">
+                    <a:lumMod val="85000"/>
+                  </a:schemeClr>
+                </a:solidFill>
+              </a:rPr>
+              <a:t>Friday</a:t>
+            </a:r>
+            <a:r>
+              <a:rPr lang="en-AU" sz="1400" dirty="0">
+                <a:solidFill>
+                  <a:schemeClr val="bg1">
+                    <a:lumMod val="85000"/>
+                  </a:schemeClr>
+                </a:solidFill>
+              </a:rPr>
+              <a:t> 1.11.19</a:t>
             </a:r>
           </a:p>
           <a:p>
@@ -3879,7 +4258,7 @@
         </p:nvSpPr>
         <p:spPr>
           <a:xfrm>
-            <a:off x="8291985" y="1257900"/>
+            <a:off x="8291985" y="1116970"/>
             <a:ext cx="3292547" cy="1384995"/>
           </a:xfrm>
           <a:prstGeom prst="rect">
@@ -3894,14 +4273,24 @@
           <a:lstStyle/>
           <a:p>
             <a:r>
-              <a:rPr lang="en-AU" sz="1400" dirty="0">
-                <a:solidFill>
-                  <a:schemeClr val="bg1">
-                    <a:lumMod val="85000"/>
-                  </a:schemeClr>
-                </a:solidFill>
-              </a:rPr>
-              <a:t>Saturday 2.11.19</a:t>
+              <a:rPr lang="en-AU" sz="1400" b="1" dirty="0">
+                <a:solidFill>
+                  <a:schemeClr val="bg1">
+                    <a:lumMod val="85000"/>
+                  </a:schemeClr>
+                </a:solidFill>
+              </a:rPr>
+              <a:t>Saturday</a:t>
+            </a:r>
+            <a:r>
+              <a:rPr lang="en-AU" sz="1400" dirty="0">
+                <a:solidFill>
+                  <a:schemeClr val="bg1">
+                    <a:lumMod val="85000"/>
+                  </a:schemeClr>
+                </a:solidFill>
+              </a:rPr>
+              <a:t> 2.11.19</a:t>
             </a:r>
           </a:p>
           <a:p>
@@ -4003,7 +4392,7 @@
         </p:nvSpPr>
         <p:spPr>
           <a:xfrm>
-            <a:off x="302628" y="2711972"/>
+            <a:off x="302628" y="2571042"/>
             <a:ext cx="2478672" cy="1815882"/>
           </a:xfrm>
           <a:prstGeom prst="rect">
@@ -4018,14 +4407,24 @@
           <a:lstStyle/>
           <a:p>
             <a:r>
-              <a:rPr lang="en-AU" sz="1400" dirty="0">
-                <a:solidFill>
-                  <a:schemeClr val="bg1">
-                    <a:lumMod val="85000"/>
-                  </a:schemeClr>
-                </a:solidFill>
-              </a:rPr>
-              <a:t>Monday 4.11.19</a:t>
+              <a:rPr lang="en-AU" sz="1400" b="1" dirty="0">
+                <a:solidFill>
+                  <a:schemeClr val="bg1">
+                    <a:lumMod val="85000"/>
+                  </a:schemeClr>
+                </a:solidFill>
+              </a:rPr>
+              <a:t>Monday</a:t>
+            </a:r>
+            <a:r>
+              <a:rPr lang="en-AU" sz="1400" dirty="0">
+                <a:solidFill>
+                  <a:schemeClr val="bg1">
+                    <a:lumMod val="85000"/>
+                  </a:schemeClr>
+                </a:solidFill>
+              </a:rPr>
+              <a:t> 4.11.19</a:t>
             </a:r>
           </a:p>
           <a:p>
@@ -4136,7 +4535,7 @@
         </p:nvSpPr>
         <p:spPr>
           <a:xfrm>
-            <a:off x="3009831" y="2737830"/>
+            <a:off x="3009831" y="2596900"/>
             <a:ext cx="2379121" cy="2031325"/>
           </a:xfrm>
           <a:prstGeom prst="rect">
@@ -4151,14 +4550,24 @@
           <a:lstStyle/>
           <a:p>
             <a:r>
-              <a:rPr lang="en-AU" sz="1400" dirty="0">
-                <a:solidFill>
-                  <a:schemeClr val="bg1">
-                    <a:lumMod val="85000"/>
-                  </a:schemeClr>
-                </a:solidFill>
-              </a:rPr>
-              <a:t>Tuesday 5.11.19</a:t>
+              <a:rPr lang="en-AU" sz="1400" b="1" dirty="0">
+                <a:solidFill>
+                  <a:schemeClr val="bg1">
+                    <a:lumMod val="85000"/>
+                  </a:schemeClr>
+                </a:solidFill>
+              </a:rPr>
+              <a:t>Tuesday</a:t>
+            </a:r>
+            <a:r>
+              <a:rPr lang="en-AU" sz="1400" dirty="0">
+                <a:solidFill>
+                  <a:schemeClr val="bg1">
+                    <a:lumMod val="85000"/>
+                  </a:schemeClr>
+                </a:solidFill>
+              </a:rPr>
+              <a:t> 5.11.19</a:t>
             </a:r>
           </a:p>
           <a:p>
@@ -4292,7 +4701,7 @@
         </p:nvSpPr>
         <p:spPr>
           <a:xfrm>
-            <a:off x="8273960" y="2717476"/>
+            <a:off x="8273960" y="2576546"/>
             <a:ext cx="3292547" cy="1815882"/>
           </a:xfrm>
           <a:prstGeom prst="rect">
@@ -4307,14 +4716,24 @@
           <a:lstStyle/>
           <a:p>
             <a:r>
-              <a:rPr lang="en-AU" sz="1400" dirty="0">
-                <a:solidFill>
-                  <a:schemeClr val="bg1">
-                    <a:lumMod val="85000"/>
-                  </a:schemeClr>
-                </a:solidFill>
-              </a:rPr>
-              <a:t>Thursday 7.11.19</a:t>
+              <a:rPr lang="en-AU" sz="1400" b="1" dirty="0">
+                <a:solidFill>
+                  <a:schemeClr val="bg1">
+                    <a:lumMod val="85000"/>
+                  </a:schemeClr>
+                </a:solidFill>
+              </a:rPr>
+              <a:t>Thursday</a:t>
+            </a:r>
+            <a:r>
+              <a:rPr lang="en-AU" sz="1400" dirty="0">
+                <a:solidFill>
+                  <a:schemeClr val="bg1">
+                    <a:lumMod val="85000"/>
+                  </a:schemeClr>
+                </a:solidFill>
+              </a:rPr>
+              <a:t> 7.11.19</a:t>
             </a:r>
           </a:p>
           <a:p>
@@ -4438,7 +4857,7 @@
         </p:nvSpPr>
         <p:spPr>
           <a:xfrm>
-            <a:off x="5618602" y="2717477"/>
+            <a:off x="5618602" y="2576547"/>
             <a:ext cx="2379121" cy="2246769"/>
           </a:xfrm>
           <a:prstGeom prst="rect">
@@ -4453,14 +4872,24 @@
           <a:lstStyle/>
           <a:p>
             <a:r>
-              <a:rPr lang="en-AU" sz="1400" dirty="0">
-                <a:solidFill>
-                  <a:schemeClr val="bg1">
-                    <a:lumMod val="85000"/>
-                  </a:schemeClr>
-                </a:solidFill>
-              </a:rPr>
-              <a:t>Wednesday 6.11.19</a:t>
+              <a:rPr lang="en-AU" sz="1400" b="1" dirty="0">
+                <a:solidFill>
+                  <a:schemeClr val="bg1">
+                    <a:lumMod val="85000"/>
+                  </a:schemeClr>
+                </a:solidFill>
+              </a:rPr>
+              <a:t>Wednesday</a:t>
+            </a:r>
+            <a:r>
+              <a:rPr lang="en-AU" sz="1400" dirty="0">
+                <a:solidFill>
+                  <a:schemeClr val="bg1">
+                    <a:lumMod val="85000"/>
+                  </a:schemeClr>
+                </a:solidFill>
+              </a:rPr>
+              <a:t> 6.11.19</a:t>
             </a:r>
           </a:p>
           <a:p>
@@ -4603,7 +5032,7 @@
         </p:nvSpPr>
         <p:spPr>
           <a:xfrm>
-            <a:off x="302628" y="4858585"/>
+            <a:off x="302628" y="4964272"/>
             <a:ext cx="2379121" cy="1815882"/>
           </a:xfrm>
           <a:prstGeom prst="rect">
@@ -4618,14 +5047,24 @@
           <a:lstStyle/>
           <a:p>
             <a:r>
-              <a:rPr lang="en-AU" sz="1400" dirty="0">
-                <a:solidFill>
-                  <a:schemeClr val="bg1">
-                    <a:lumMod val="85000"/>
-                  </a:schemeClr>
-                </a:solidFill>
-              </a:rPr>
-              <a:t>Friday 8.11.19</a:t>
+              <a:rPr lang="en-AU" sz="1400" b="1" dirty="0">
+                <a:solidFill>
+                  <a:schemeClr val="bg1">
+                    <a:lumMod val="85000"/>
+                  </a:schemeClr>
+                </a:solidFill>
+              </a:rPr>
+              <a:t>Friday</a:t>
+            </a:r>
+            <a:r>
+              <a:rPr lang="en-AU" sz="1400" dirty="0">
+                <a:solidFill>
+                  <a:schemeClr val="bg1">
+                    <a:lumMod val="85000"/>
+                  </a:schemeClr>
+                </a:solidFill>
+              </a:rPr>
+              <a:t> 8.11.19</a:t>
             </a:r>
           </a:p>
           <a:p>
@@ -4736,7 +5175,7 @@
         </p:nvSpPr>
         <p:spPr>
           <a:xfrm>
-            <a:off x="3009831" y="4864090"/>
+            <a:off x="3009831" y="4969777"/>
             <a:ext cx="1732991" cy="1600438"/>
           </a:xfrm>
           <a:prstGeom prst="rect">
@@ -4751,14 +5190,24 @@
           <a:lstStyle/>
           <a:p>
             <a:r>
-              <a:rPr lang="en-AU" sz="1400" dirty="0">
-                <a:solidFill>
-                  <a:schemeClr val="bg1">
-                    <a:lumMod val="85000"/>
-                  </a:schemeClr>
-                </a:solidFill>
-              </a:rPr>
-              <a:t>Saturday 9.11.19</a:t>
+              <a:rPr lang="en-AU" sz="1400" b="1" dirty="0">
+                <a:solidFill>
+                  <a:schemeClr val="bg1">
+                    <a:lumMod val="85000"/>
+                  </a:schemeClr>
+                </a:solidFill>
+              </a:rPr>
+              <a:t>Saturday</a:t>
+            </a:r>
+            <a:r>
+              <a:rPr lang="en-AU" sz="1400" dirty="0">
+                <a:solidFill>
+                  <a:schemeClr val="bg1">
+                    <a:lumMod val="85000"/>
+                  </a:schemeClr>
+                </a:solidFill>
+              </a:rPr>
+              <a:t> 9.11.19</a:t>
             </a:r>
           </a:p>
           <a:p>
@@ -4891,14 +5340,24 @@
           <a:lstStyle/>
           <a:p>
             <a:r>
-              <a:rPr lang="en-AU" sz="1400" dirty="0">
-                <a:solidFill>
-                  <a:schemeClr val="bg1">
-                    <a:lumMod val="85000"/>
-                  </a:schemeClr>
-                </a:solidFill>
-              </a:rPr>
-              <a:t>Sunday 10.11.19</a:t>
+              <a:rPr lang="en-AU" sz="1400" b="1" dirty="0">
+                <a:solidFill>
+                  <a:schemeClr val="bg1">
+                    <a:lumMod val="85000"/>
+                  </a:schemeClr>
+                </a:solidFill>
+              </a:rPr>
+              <a:t>Sunday</a:t>
+            </a:r>
+            <a:r>
+              <a:rPr lang="en-AU" sz="1400" dirty="0">
+                <a:solidFill>
+                  <a:schemeClr val="bg1">
+                    <a:lumMod val="85000"/>
+                  </a:schemeClr>
+                </a:solidFill>
+              </a:rPr>
+              <a:t> 10.11.19</a:t>
             </a:r>
           </a:p>
           <a:p>

</xml_diff>